<commit_message>
small updates in lab-slides
</commit_message>
<xml_diff>
--- a/lab-slides.pptx
+++ b/lab-slides.pptx
@@ -290,7 +290,7 @@
     </p:spTree>
     <p:extLst>
       <p:ext uri="{BB962C8B-B14F-4D97-AF65-F5344CB8AC3E}">
-        <p14:creationId xmlns:p14="http://schemas.microsoft.com/office/powerpoint/2010/main" xmlns="" val="1579871206"/>
+        <p14:creationId xmlns="" xmlns:p14="http://schemas.microsoft.com/office/powerpoint/2010/main" val="1579871206"/>
       </p:ext>
     </p:extLst>
   </p:cSld>
@@ -607,7 +607,7 @@
     </p:spTree>
     <p:extLst>
       <p:ext uri="{BB962C8B-B14F-4D97-AF65-F5344CB8AC3E}">
-        <p14:creationId xmlns:p14="http://schemas.microsoft.com/office/powerpoint/2010/main" xmlns="" val="408905946"/>
+        <p14:creationId xmlns="" xmlns:p14="http://schemas.microsoft.com/office/powerpoint/2010/main" val="408905946"/>
       </p:ext>
     </p:extLst>
   </p:cSld>
@@ -705,7 +705,7 @@
     </p:spTree>
     <p:extLst>
       <p:ext uri="{BB962C8B-B14F-4D97-AF65-F5344CB8AC3E}">
-        <p14:creationId xmlns:p14="http://schemas.microsoft.com/office/powerpoint/2010/main" xmlns="" val="3613587602"/>
+        <p14:creationId xmlns="" xmlns:p14="http://schemas.microsoft.com/office/powerpoint/2010/main" val="3613587602"/>
       </p:ext>
     </p:extLst>
   </p:cSld>
@@ -786,7 +786,7 @@
     </p:spTree>
     <p:extLst>
       <p:ext uri="{BB962C8B-B14F-4D97-AF65-F5344CB8AC3E}">
-        <p14:creationId xmlns:p14="http://schemas.microsoft.com/office/powerpoint/2010/main" xmlns="" val="3613587602"/>
+        <p14:creationId xmlns="" xmlns:p14="http://schemas.microsoft.com/office/powerpoint/2010/main" val="3613587602"/>
       </p:ext>
     </p:extLst>
   </p:cSld>
@@ -846,14 +846,14 @@
           <a:ln/>
           <a:extLst>
             <a:ext uri="{909E8E84-426E-40dd-AFC4-6F175D3DCCD1}">
-              <a14:hiddenFill xmlns:a14="http://schemas.microsoft.com/office/drawing/2010/main" xmlns="">
+              <a14:hiddenFill xmlns="" xmlns:a14="http://schemas.microsoft.com/office/drawing/2010/main">
                 <a:solidFill>
                   <a:srgbClr val="FFFFFF"/>
                 </a:solidFill>
               </a14:hiddenFill>
             </a:ext>
             <a:ext uri="{91240B29-F687-4f45-9708-019B960494DF}">
-              <a14:hiddenLine xmlns:a14="http://schemas.microsoft.com/office/drawing/2010/main" xmlns="" w="9525">
+              <a14:hiddenLine xmlns="" xmlns:a14="http://schemas.microsoft.com/office/drawing/2010/main" w="9525">
                 <a:solidFill>
                   <a:srgbClr val="000000"/>
                 </a:solidFill>
@@ -933,14 +933,14 @@
           <a:ln/>
           <a:extLst>
             <a:ext uri="{909E8E84-426E-40dd-AFC4-6F175D3DCCD1}">
-              <a14:hiddenFill xmlns:a14="http://schemas.microsoft.com/office/drawing/2010/main" xmlns="">
+              <a14:hiddenFill xmlns="" xmlns:a14="http://schemas.microsoft.com/office/drawing/2010/main">
                 <a:solidFill>
                   <a:srgbClr val="FFFFFF"/>
                 </a:solidFill>
               </a14:hiddenFill>
             </a:ext>
             <a:ext uri="{91240B29-F687-4f45-9708-019B960494DF}">
-              <a14:hiddenLine xmlns:a14="http://schemas.microsoft.com/office/drawing/2010/main" xmlns="" w="9525">
+              <a14:hiddenLine xmlns="" xmlns:a14="http://schemas.microsoft.com/office/drawing/2010/main" w="9525">
                 <a:solidFill>
                   <a:srgbClr val="000000"/>
                 </a:solidFill>
@@ -1020,14 +1020,14 @@
           <a:ln/>
           <a:extLst>
             <a:ext uri="{909E8E84-426E-40dd-AFC4-6F175D3DCCD1}">
-              <a14:hiddenFill xmlns:a14="http://schemas.microsoft.com/office/drawing/2010/main" xmlns="">
+              <a14:hiddenFill xmlns="" xmlns:a14="http://schemas.microsoft.com/office/drawing/2010/main">
                 <a:solidFill>
                   <a:srgbClr val="FFFFFF"/>
                 </a:solidFill>
               </a14:hiddenFill>
             </a:ext>
             <a:ext uri="{91240B29-F687-4f45-9708-019B960494DF}">
-              <a14:hiddenLine xmlns:a14="http://schemas.microsoft.com/office/drawing/2010/main" xmlns="" w="9525">
+              <a14:hiddenLine xmlns="" xmlns:a14="http://schemas.microsoft.com/office/drawing/2010/main" w="9525">
                 <a:solidFill>
                   <a:srgbClr val="000000"/>
                 </a:solidFill>
@@ -1107,14 +1107,14 @@
           <a:ln/>
           <a:extLst>
             <a:ext uri="{909E8E84-426E-40dd-AFC4-6F175D3DCCD1}">
-              <a14:hiddenFill xmlns:a14="http://schemas.microsoft.com/office/drawing/2010/main" xmlns="">
+              <a14:hiddenFill xmlns="" xmlns:a14="http://schemas.microsoft.com/office/drawing/2010/main">
                 <a:solidFill>
                   <a:srgbClr val="FFFFFF"/>
                 </a:solidFill>
               </a14:hiddenFill>
             </a:ext>
             <a:ext uri="{91240B29-F687-4f45-9708-019B960494DF}">
-              <a14:hiddenLine xmlns:a14="http://schemas.microsoft.com/office/drawing/2010/main" xmlns="" w="9525">
+              <a14:hiddenLine xmlns="" xmlns:a14="http://schemas.microsoft.com/office/drawing/2010/main" w="9525">
                 <a:solidFill>
                   <a:srgbClr val="000000"/>
                 </a:solidFill>
@@ -1411,7 +1411,7 @@
     </p:spTree>
     <p:extLst>
       <p:ext uri="{BB962C8B-B14F-4D97-AF65-F5344CB8AC3E}">
-        <p14:creationId xmlns:p14="http://schemas.microsoft.com/office/powerpoint/2010/main" xmlns="" val="2648933429"/>
+        <p14:creationId xmlns="" xmlns:p14="http://schemas.microsoft.com/office/powerpoint/2010/main" val="2648933429"/>
       </p:ext>
     </p:extLst>
   </p:cSld>
@@ -1585,7 +1585,7 @@
     </p:spTree>
     <p:extLst>
       <p:ext uri="{BB962C8B-B14F-4D97-AF65-F5344CB8AC3E}">
-        <p14:creationId xmlns:p14="http://schemas.microsoft.com/office/powerpoint/2010/main" xmlns="" val="3444978936"/>
+        <p14:creationId xmlns="" xmlns:p14="http://schemas.microsoft.com/office/powerpoint/2010/main" val="3444978936"/>
       </p:ext>
     </p:extLst>
   </p:cSld>
@@ -1934,7 +1934,7 @@
     </p:spTree>
     <p:extLst>
       <p:ext uri="{BB962C8B-B14F-4D97-AF65-F5344CB8AC3E}">
-        <p14:creationId xmlns:p14="http://schemas.microsoft.com/office/powerpoint/2010/main" xmlns="" val="1657462926"/>
+        <p14:creationId xmlns="" xmlns:p14="http://schemas.microsoft.com/office/powerpoint/2010/main" val="1657462926"/>
       </p:ext>
     </p:extLst>
   </p:cSld>
@@ -2218,7 +2218,7 @@
     </p:spTree>
     <p:extLst>
       <p:ext uri="{BB962C8B-B14F-4D97-AF65-F5344CB8AC3E}">
-        <p14:creationId xmlns:p14="http://schemas.microsoft.com/office/powerpoint/2010/main" xmlns="" val="1481096833"/>
+        <p14:creationId xmlns="" xmlns:p14="http://schemas.microsoft.com/office/powerpoint/2010/main" val="1481096833"/>
       </p:ext>
     </p:extLst>
   </p:cSld>
@@ -2407,7 +2407,7 @@
     </p:spTree>
     <p:extLst>
       <p:ext uri="{BB962C8B-B14F-4D97-AF65-F5344CB8AC3E}">
-        <p14:creationId xmlns:p14="http://schemas.microsoft.com/office/powerpoint/2010/main" xmlns="" val="1472055386"/>
+        <p14:creationId xmlns="" xmlns:p14="http://schemas.microsoft.com/office/powerpoint/2010/main" val="1472055386"/>
       </p:ext>
     </p:extLst>
   </p:cSld>
@@ -2561,7 +2561,7 @@
     </p:spTree>
     <p:extLst>
       <p:ext uri="{BB962C8B-B14F-4D97-AF65-F5344CB8AC3E}">
-        <p14:creationId xmlns:p14="http://schemas.microsoft.com/office/powerpoint/2010/main" xmlns="" val="2489207514"/>
+        <p14:creationId xmlns="" xmlns:p14="http://schemas.microsoft.com/office/powerpoint/2010/main" val="2489207514"/>
       </p:ext>
     </p:extLst>
   </p:cSld>
@@ -2646,7 +2646,7 @@
     </p:spTree>
     <p:extLst>
       <p:ext uri="{BB962C8B-B14F-4D97-AF65-F5344CB8AC3E}">
-        <p14:creationId xmlns:p14="http://schemas.microsoft.com/office/powerpoint/2010/main" xmlns="" val="2335954520"/>
+        <p14:creationId xmlns="" xmlns:p14="http://schemas.microsoft.com/office/powerpoint/2010/main" val="2335954520"/>
       </p:ext>
     </p:extLst>
   </p:cSld>
@@ -3070,7 +3070,7 @@
     </p:spTree>
     <p:extLst>
       <p:ext uri="{BB962C8B-B14F-4D97-AF65-F5344CB8AC3E}">
-        <p14:creationId xmlns:p14="http://schemas.microsoft.com/office/powerpoint/2010/main" xmlns="" val="2067011542"/>
+        <p14:creationId xmlns="" xmlns:p14="http://schemas.microsoft.com/office/powerpoint/2010/main" val="2067011542"/>
       </p:ext>
     </p:extLst>
   </p:cSld>
@@ -3399,7 +3399,7 @@
     </p:spTree>
     <p:extLst>
       <p:ext uri="{BB962C8B-B14F-4D97-AF65-F5344CB8AC3E}">
-        <p14:creationId xmlns:p14="http://schemas.microsoft.com/office/powerpoint/2010/main" xmlns="" val="2875039731"/>
+        <p14:creationId xmlns="" xmlns:p14="http://schemas.microsoft.com/office/powerpoint/2010/main" val="2875039731"/>
       </p:ext>
     </p:extLst>
   </p:cSld>
@@ -3407,7 +3407,7 @@
     <a:masterClrMapping/>
   </p:clrMapOvr>
   <mc:AlternateContent xmlns:mc="http://schemas.openxmlformats.org/markup-compatibility/2006">
-    <mc:Choice xmlns:p14="http://schemas.microsoft.com/office/powerpoint/2010/main" xmlns="" Requires="p14">
+    <mc:Choice xmlns="" xmlns:p14="http://schemas.microsoft.com/office/powerpoint/2010/main" Requires="p14">
       <p:transition spd="med" p14:dur="700">
         <p:fade/>
       </p:transition>
@@ -8448,7 +8448,7 @@
     </p:spTree>
     <p:extLst>
       <p:ext uri="{BB962C8B-B14F-4D97-AF65-F5344CB8AC3E}">
-        <p14:creationId xmlns:p14="http://schemas.microsoft.com/office/powerpoint/2010/main" xmlns="" val="2626179777"/>
+        <p14:creationId xmlns="" xmlns:p14="http://schemas.microsoft.com/office/powerpoint/2010/main" val="2626179777"/>
       </p:ext>
     </p:extLst>
   </p:cSld>
@@ -8629,7 +8629,7 @@
     </p:spTree>
     <p:extLst>
       <p:ext uri="{BB962C8B-B14F-4D97-AF65-F5344CB8AC3E}">
-        <p14:creationId xmlns:p14="http://schemas.microsoft.com/office/powerpoint/2010/main" xmlns="" val="4140825685"/>
+        <p14:creationId xmlns="" xmlns:p14="http://schemas.microsoft.com/office/powerpoint/2010/main" val="4140825685"/>
       </p:ext>
     </p:extLst>
   </p:cSld>
@@ -8765,7 +8765,7 @@
     </p:spTree>
     <p:extLst>
       <p:ext uri="{BB962C8B-B14F-4D97-AF65-F5344CB8AC3E}">
-        <p14:creationId xmlns:p14="http://schemas.microsoft.com/office/powerpoint/2010/main" xmlns="" val="3404178465"/>
+        <p14:creationId xmlns="" xmlns:p14="http://schemas.microsoft.com/office/powerpoint/2010/main" val="3404178465"/>
       </p:ext>
     </p:extLst>
   </p:cSld>
@@ -8911,7 +8911,7 @@
     </p:spTree>
     <p:extLst>
       <p:ext uri="{BB962C8B-B14F-4D97-AF65-F5344CB8AC3E}">
-        <p14:creationId xmlns:p14="http://schemas.microsoft.com/office/powerpoint/2010/main" xmlns="" val="1588396261"/>
+        <p14:creationId xmlns="" xmlns:p14="http://schemas.microsoft.com/office/powerpoint/2010/main" val="1588396261"/>
       </p:ext>
     </p:extLst>
   </p:cSld>
@@ -9700,7 +9700,7 @@
     </p:spTree>
     <p:extLst>
       <p:ext uri="{BB962C8B-B14F-4D97-AF65-F5344CB8AC3E}">
-        <p14:creationId xmlns:p14="http://schemas.microsoft.com/office/powerpoint/2010/main" xmlns="" val="2187278312"/>
+        <p14:creationId xmlns="" xmlns:p14="http://schemas.microsoft.com/office/powerpoint/2010/main" val="2187278312"/>
       </p:ext>
     </p:extLst>
   </p:cSld>
@@ -10504,7 +10504,7 @@
     </p:spTree>
     <p:extLst>
       <p:ext uri="{BB962C8B-B14F-4D97-AF65-F5344CB8AC3E}">
-        <p14:creationId xmlns:p14="http://schemas.microsoft.com/office/powerpoint/2010/main" xmlns="" val="249188942"/>
+        <p14:creationId xmlns="" xmlns:p14="http://schemas.microsoft.com/office/powerpoint/2010/main" val="249188942"/>
       </p:ext>
     </p:extLst>
   </p:cSld>
@@ -10696,7 +10696,7 @@
     </p:spTree>
     <p:extLst>
       <p:ext uri="{BB962C8B-B14F-4D97-AF65-F5344CB8AC3E}">
-        <p14:creationId xmlns:p14="http://schemas.microsoft.com/office/powerpoint/2010/main" xmlns="" val="690056917"/>
+        <p14:creationId xmlns="" xmlns:p14="http://schemas.microsoft.com/office/powerpoint/2010/main" val="690056917"/>
       </p:ext>
     </p:extLst>
   </p:cSld>
@@ -10777,8 +10777,8 @@
           <a:p>
             <a:pPr lvl="1"/>
             <a:r>
-              <a:rPr lang="en-US" sz="3600" dirty="0" err="1"/>
-              <a:t>EventChannel</a:t>
+              <a:rPr lang="en-US" sz="3600" dirty="0" err="1" smtClean="0"/>
+              <a:t>EventOutput</a:t>
             </a:r>
             <a:endParaRPr lang="en-US" sz="3600" dirty="0"/>
           </a:p>
@@ -10789,14 +10789,6 @@
               <a:t>SseBroadcaster</a:t>
             </a:r>
             <a:endParaRPr lang="en-US" sz="3600" dirty="0"/>
-          </a:p>
-          <a:p>
-            <a:pPr lvl="1"/>
-            <a:r>
-              <a:rPr lang="en-US" sz="3600" dirty="0" err="1" smtClean="0"/>
-              <a:t>BroadcasterListener</a:t>
-            </a:r>
-            <a:endParaRPr lang="en-US" sz="3600" dirty="0" smtClean="0"/>
           </a:p>
         </p:txBody>
       </p:sp>
@@ -10849,7 +10841,7 @@
     </p:spTree>
     <p:extLst>
       <p:ext uri="{BB962C8B-B14F-4D97-AF65-F5344CB8AC3E}">
-        <p14:creationId xmlns:p14="http://schemas.microsoft.com/office/powerpoint/2010/main" xmlns="" val="3234047228"/>
+        <p14:creationId xmlns="" xmlns:p14="http://schemas.microsoft.com/office/powerpoint/2010/main" val="3234047228"/>
       </p:ext>
     </p:extLst>
   </p:cSld>
@@ -11232,7 +11224,7 @@
     </p:spTree>
     <p:extLst>
       <p:ext uri="{BB962C8B-B14F-4D97-AF65-F5344CB8AC3E}">
-        <p14:creationId xmlns:p14="http://schemas.microsoft.com/office/powerpoint/2010/main" xmlns="" val="788503570"/>
+        <p14:creationId xmlns="" xmlns:p14="http://schemas.microsoft.com/office/powerpoint/2010/main" val="788503570"/>
       </p:ext>
     </p:extLst>
   </p:cSld>
@@ -11609,7 +11601,7 @@
     </p:spTree>
     <p:extLst>
       <p:ext uri="{BB962C8B-B14F-4D97-AF65-F5344CB8AC3E}">
-        <p14:creationId xmlns:p14="http://schemas.microsoft.com/office/powerpoint/2010/main" xmlns="" val="298729000"/>
+        <p14:creationId xmlns="" xmlns:p14="http://schemas.microsoft.com/office/powerpoint/2010/main" val="298729000"/>
       </p:ext>
     </p:extLst>
   </p:cSld>
@@ -11756,7 +11748,7 @@
     </p:spTree>
     <p:extLst>
       <p:ext uri="{BB962C8B-B14F-4D97-AF65-F5344CB8AC3E}">
-        <p14:creationId xmlns:p14="http://schemas.microsoft.com/office/powerpoint/2010/main" xmlns="" val="3066571328"/>
+        <p14:creationId xmlns="" xmlns:p14="http://schemas.microsoft.com/office/powerpoint/2010/main" val="3066571328"/>
       </p:ext>
     </p:extLst>
   </p:cSld>
@@ -12073,7 +12065,7 @@
     </p:spTree>
     <p:extLst>
       <p:ext uri="{BB962C8B-B14F-4D97-AF65-F5344CB8AC3E}">
-        <p14:creationId xmlns:p14="http://schemas.microsoft.com/office/powerpoint/2010/main" xmlns="" val="122721243"/>
+        <p14:creationId xmlns="" xmlns:p14="http://schemas.microsoft.com/office/powerpoint/2010/main" val="122721243"/>
       </p:ext>
     </p:extLst>
   </p:cSld>
@@ -12261,7 +12253,7 @@
     </p:spTree>
     <p:extLst>
       <p:ext uri="{BB962C8B-B14F-4D97-AF65-F5344CB8AC3E}">
-        <p14:creationId xmlns:p14="http://schemas.microsoft.com/office/powerpoint/2010/main" xmlns="" val="2213924771"/>
+        <p14:creationId xmlns="" xmlns:p14="http://schemas.microsoft.com/office/powerpoint/2010/main" val="2213924771"/>
       </p:ext>
     </p:extLst>
   </p:cSld>
@@ -12348,7 +12340,7 @@
     </p:spTree>
     <p:extLst>
       <p:ext uri="{BB962C8B-B14F-4D97-AF65-F5344CB8AC3E}">
-        <p14:creationId xmlns:p14="http://schemas.microsoft.com/office/powerpoint/2010/main" xmlns="" val="584931841"/>
+        <p14:creationId xmlns="" xmlns:p14="http://schemas.microsoft.com/office/powerpoint/2010/main" val="584931841"/>
       </p:ext>
     </p:extLst>
   </p:cSld>
@@ -12394,7 +12386,7 @@
           <a:blip r:embed="rId3" cstate="print">
             <a:extLst>
               <a:ext uri="{28A0092B-C50C-407E-A947-70E740481C1C}">
-                <a14:useLocalDpi xmlns:a14="http://schemas.microsoft.com/office/drawing/2010/main" xmlns="" val="0"/>
+                <a14:useLocalDpi xmlns="" xmlns:a14="http://schemas.microsoft.com/office/drawing/2010/main" val="0"/>
               </a:ext>
             </a:extLst>
           </a:blip>
@@ -12417,14 +12409,14 @@
           </a:ln>
           <a:extLst>
             <a:ext uri="{909E8E84-426E-40dd-AFC4-6F175D3DCCD1}">
-              <a14:hiddenFill xmlns:a14="http://schemas.microsoft.com/office/drawing/2010/main" xmlns="">
+              <a14:hiddenFill xmlns="" xmlns:a14="http://schemas.microsoft.com/office/drawing/2010/main">
                 <a:solidFill>
                   <a:srgbClr val="FFFFFF"/>
                 </a:solidFill>
               </a14:hiddenFill>
             </a:ext>
             <a:ext uri="{91240B29-F687-4f45-9708-019B960494DF}">
-              <a14:hiddenLine xmlns:a14="http://schemas.microsoft.com/office/drawing/2010/main" xmlns="" w="9525" cap="flat">
+              <a14:hiddenLine xmlns="" xmlns:a14="http://schemas.microsoft.com/office/drawing/2010/main" w="9525" cap="flat">
                 <a:solidFill>
                   <a:schemeClr val="tx1"/>
                 </a:solidFill>
@@ -12533,7 +12525,7 @@
           <a:blip r:embed="rId4" cstate="print">
             <a:extLst>
               <a:ext uri="{28A0092B-C50C-407E-A947-70E740481C1C}">
-                <a14:useLocalDpi xmlns:a14="http://schemas.microsoft.com/office/drawing/2010/main" xmlns="" val="0"/>
+                <a14:useLocalDpi xmlns="" xmlns:a14="http://schemas.microsoft.com/office/drawing/2010/main" val="0"/>
               </a:ext>
             </a:extLst>
           </a:blip>
@@ -12556,14 +12548,14 @@
           </a:ln>
           <a:extLst>
             <a:ext uri="{909E8E84-426E-40dd-AFC4-6F175D3DCCD1}">
-              <a14:hiddenFill xmlns:a14="http://schemas.microsoft.com/office/drawing/2010/main" xmlns="">
+              <a14:hiddenFill xmlns="" xmlns:a14="http://schemas.microsoft.com/office/drawing/2010/main">
                 <a:solidFill>
                   <a:srgbClr val="FFFFFF"/>
                 </a:solidFill>
               </a14:hiddenFill>
             </a:ext>
             <a:ext uri="{91240B29-F687-4f45-9708-019B960494DF}">
-              <a14:hiddenLine xmlns:a14="http://schemas.microsoft.com/office/drawing/2010/main" xmlns="" w="9525" cap="flat">
+              <a14:hiddenLine xmlns="" xmlns:a14="http://schemas.microsoft.com/office/drawing/2010/main" w="9525" cap="flat">
                 <a:solidFill>
                   <a:schemeClr val="tx1"/>
                 </a:solidFill>
@@ -12578,7 +12570,7 @@
     </p:spTree>
     <p:extLst>
       <p:ext uri="{BB962C8B-B14F-4D97-AF65-F5344CB8AC3E}">
-        <p14:creationId xmlns:p14="http://schemas.microsoft.com/office/powerpoint/2010/main" xmlns="" val="612926124"/>
+        <p14:creationId xmlns="" xmlns:p14="http://schemas.microsoft.com/office/powerpoint/2010/main" val="612926124"/>
       </p:ext>
     </p:extLst>
   </p:cSld>
@@ -12741,7 +12733,7 @@
           <a:blip r:embed="rId3" cstate="print">
             <a:extLst>
               <a:ext uri="{28A0092B-C50C-407E-A947-70E740481C1C}">
-                <a14:useLocalDpi xmlns:a14="http://schemas.microsoft.com/office/drawing/2010/main" xmlns="" val="0"/>
+                <a14:useLocalDpi xmlns="" xmlns:a14="http://schemas.microsoft.com/office/drawing/2010/main" val="0"/>
               </a:ext>
             </a:extLst>
           </a:blip>
@@ -12764,14 +12756,14 @@
           </a:ln>
           <a:extLst>
             <a:ext uri="{909E8E84-426E-40dd-AFC4-6F175D3DCCD1}">
-              <a14:hiddenFill xmlns:a14="http://schemas.microsoft.com/office/drawing/2010/main" xmlns="">
+              <a14:hiddenFill xmlns="" xmlns:a14="http://schemas.microsoft.com/office/drawing/2010/main">
                 <a:solidFill>
                   <a:srgbClr val="FFFFFF"/>
                 </a:solidFill>
               </a14:hiddenFill>
             </a:ext>
             <a:ext uri="{91240B29-F687-4f45-9708-019B960494DF}">
-              <a14:hiddenLine xmlns:a14="http://schemas.microsoft.com/office/drawing/2010/main" xmlns="" w="9525" cap="flat">
+              <a14:hiddenLine xmlns="" xmlns:a14="http://schemas.microsoft.com/office/drawing/2010/main" w="9525" cap="flat">
                 <a:solidFill>
                   <a:schemeClr val="tx1"/>
                 </a:solidFill>
@@ -12795,7 +12787,7 @@
           <a:blip r:embed="rId4" cstate="print">
             <a:extLst>
               <a:ext uri="{28A0092B-C50C-407E-A947-70E740481C1C}">
-                <a14:useLocalDpi xmlns:a14="http://schemas.microsoft.com/office/drawing/2010/main" xmlns="" val="0"/>
+                <a14:useLocalDpi xmlns="" xmlns:a14="http://schemas.microsoft.com/office/drawing/2010/main" val="0"/>
               </a:ext>
             </a:extLst>
           </a:blip>
@@ -12818,14 +12810,14 @@
           </a:ln>
           <a:extLst>
             <a:ext uri="{909E8E84-426E-40dd-AFC4-6F175D3DCCD1}">
-              <a14:hiddenFill xmlns:a14="http://schemas.microsoft.com/office/drawing/2010/main" xmlns="">
+              <a14:hiddenFill xmlns="" xmlns:a14="http://schemas.microsoft.com/office/drawing/2010/main">
                 <a:solidFill>
                   <a:srgbClr val="FFFFFF"/>
                 </a:solidFill>
               </a14:hiddenFill>
             </a:ext>
             <a:ext uri="{91240B29-F687-4f45-9708-019B960494DF}">
-              <a14:hiddenLine xmlns:a14="http://schemas.microsoft.com/office/drawing/2010/main" xmlns="" w="9525" cap="flat">
+              <a14:hiddenLine xmlns="" xmlns:a14="http://schemas.microsoft.com/office/drawing/2010/main" w="9525" cap="flat">
                 <a:solidFill>
                   <a:schemeClr val="tx1"/>
                 </a:solidFill>
@@ -12840,7 +12832,7 @@
     </p:spTree>
     <p:extLst>
       <p:ext uri="{BB962C8B-B14F-4D97-AF65-F5344CB8AC3E}">
-        <p14:creationId xmlns:p14="http://schemas.microsoft.com/office/powerpoint/2010/main" xmlns="" val="3700941081"/>
+        <p14:creationId xmlns="" xmlns:p14="http://schemas.microsoft.com/office/powerpoint/2010/main" val="3700941081"/>
       </p:ext>
     </p:extLst>
   </p:cSld>
@@ -12848,7 +12840,7 @@
     <a:masterClrMapping/>
   </p:clrMapOvr>
   <mc:AlternateContent xmlns:mc="http://schemas.openxmlformats.org/markup-compatibility/2006">
-    <mc:Choice xmlns:p14="http://schemas.microsoft.com/office/powerpoint/2010/main" xmlns="" Requires="p14">
+    <mc:Choice xmlns="" xmlns:p14="http://schemas.microsoft.com/office/powerpoint/2010/main" Requires="p14">
       <p:transition spd="slow" p14:dur="2000"/>
     </mc:Choice>
     <mc:Fallback>
@@ -12973,7 +12965,7 @@
     </p:spTree>
     <p:extLst>
       <p:ext uri="{BB962C8B-B14F-4D97-AF65-F5344CB8AC3E}">
-        <p14:creationId xmlns:p14="http://schemas.microsoft.com/office/powerpoint/2010/main" xmlns="" val="3591718986"/>
+        <p14:creationId xmlns="" xmlns:p14="http://schemas.microsoft.com/office/powerpoint/2010/main" val="3591718986"/>
       </p:ext>
     </p:extLst>
   </p:cSld>
@@ -12981,7 +12973,7 @@
     <a:masterClrMapping/>
   </p:clrMapOvr>
   <mc:AlternateContent xmlns:mc="http://schemas.openxmlformats.org/markup-compatibility/2006">
-    <mc:Choice xmlns:p14="http://schemas.microsoft.com/office/powerpoint/2010/main" xmlns="" Requires="p14">
+    <mc:Choice xmlns="" xmlns:p14="http://schemas.microsoft.com/office/powerpoint/2010/main" Requires="p14">
       <p:transition spd="slow" p14:dur="2000"/>
     </mc:Choice>
     <mc:Fallback>
@@ -13027,7 +13019,7 @@
           <a:blip r:embed="rId2" cstate="print">
             <a:extLst>
               <a:ext uri="{28A0092B-C50C-407E-A947-70E740481C1C}">
-                <a14:useLocalDpi xmlns:a14="http://schemas.microsoft.com/office/drawing/2010/main" xmlns="" val="0"/>
+                <a14:useLocalDpi xmlns="" xmlns:a14="http://schemas.microsoft.com/office/drawing/2010/main" val="0"/>
               </a:ext>
             </a:extLst>
           </a:blip>
@@ -13050,14 +13042,14 @@
           </a:ln>
           <a:extLst>
             <a:ext uri="{909E8E84-426E-40dd-AFC4-6F175D3DCCD1}">
-              <a14:hiddenFill xmlns:a14="http://schemas.microsoft.com/office/drawing/2010/main" xmlns="">
+              <a14:hiddenFill xmlns="" xmlns:a14="http://schemas.microsoft.com/office/drawing/2010/main">
                 <a:solidFill>
                   <a:srgbClr val="FFFFFF"/>
                 </a:solidFill>
               </a14:hiddenFill>
             </a:ext>
             <a:ext uri="{91240B29-F687-4f45-9708-019B960494DF}">
-              <a14:hiddenLine xmlns:a14="http://schemas.microsoft.com/office/drawing/2010/main" xmlns="" w="9525" cap="flat">
+              <a14:hiddenLine xmlns="" xmlns:a14="http://schemas.microsoft.com/office/drawing/2010/main" w="9525" cap="flat">
                 <a:solidFill>
                   <a:schemeClr val="tx1"/>
                 </a:solidFill>
@@ -13097,7 +13089,7 @@
             <a:blip r:embed="rId3" cstate="print">
               <a:extLst>
                 <a:ext uri="{28A0092B-C50C-407E-A947-70E740481C1C}">
-                  <a14:useLocalDpi xmlns:a14="http://schemas.microsoft.com/office/drawing/2010/main" xmlns="" val="0"/>
+                  <a14:useLocalDpi xmlns="" xmlns:a14="http://schemas.microsoft.com/office/drawing/2010/main" val="0"/>
                 </a:ext>
               </a:extLst>
             </a:blip>
@@ -13120,14 +13112,14 @@
             </a:ln>
             <a:extLst>
               <a:ext uri="{909E8E84-426E-40dd-AFC4-6F175D3DCCD1}">
-                <a14:hiddenFill xmlns:a14="http://schemas.microsoft.com/office/drawing/2010/main" xmlns="">
+                <a14:hiddenFill xmlns="" xmlns:a14="http://schemas.microsoft.com/office/drawing/2010/main">
                   <a:solidFill>
                     <a:srgbClr val="FFFFFF"/>
                   </a:solidFill>
                 </a14:hiddenFill>
               </a:ext>
               <a:ext uri="{91240B29-F687-4f45-9708-019B960494DF}">
-                <a14:hiddenLine xmlns:a14="http://schemas.microsoft.com/office/drawing/2010/main" xmlns="" w="9525" cap="flat">
+                <a14:hiddenLine xmlns="" xmlns:a14="http://schemas.microsoft.com/office/drawing/2010/main" w="9525" cap="flat">
                   <a:solidFill>
                     <a:schemeClr val="tx1"/>
                   </a:solidFill>
@@ -13151,7 +13143,7 @@
             <a:blip r:embed="rId4" cstate="print">
               <a:extLst>
                 <a:ext uri="{28A0092B-C50C-407E-A947-70E740481C1C}">
-                  <a14:useLocalDpi xmlns:a14="http://schemas.microsoft.com/office/drawing/2010/main" xmlns="" val="0"/>
+                  <a14:useLocalDpi xmlns="" xmlns:a14="http://schemas.microsoft.com/office/drawing/2010/main" val="0"/>
                 </a:ext>
               </a:extLst>
             </a:blip>
@@ -13174,14 +13166,14 @@
             </a:ln>
             <a:extLst>
               <a:ext uri="{909E8E84-426E-40dd-AFC4-6F175D3DCCD1}">
-                <a14:hiddenFill xmlns:a14="http://schemas.microsoft.com/office/drawing/2010/main" xmlns="">
+                <a14:hiddenFill xmlns="" xmlns:a14="http://schemas.microsoft.com/office/drawing/2010/main">
                   <a:solidFill>
                     <a:srgbClr val="FFFFFF"/>
                   </a:solidFill>
                 </a14:hiddenFill>
               </a:ext>
               <a:ext uri="{91240B29-F687-4f45-9708-019B960494DF}">
-                <a14:hiddenLine xmlns:a14="http://schemas.microsoft.com/office/drawing/2010/main" xmlns="" w="9525" cap="flat">
+                <a14:hiddenLine xmlns="" xmlns:a14="http://schemas.microsoft.com/office/drawing/2010/main" w="9525" cap="flat">
                   <a:solidFill>
                     <a:schemeClr val="tx1"/>
                   </a:solidFill>
@@ -13250,7 +13242,7 @@
           </a:ln>
           <a:extLst>
             <a:ext uri="{91240B29-F687-4f45-9708-019B960494DF}">
-              <a14:hiddenLine xmlns:a14="http://schemas.microsoft.com/office/drawing/2010/main" xmlns="" w="9525" cap="flat">
+              <a14:hiddenLine xmlns="" xmlns:a14="http://schemas.microsoft.com/office/drawing/2010/main" w="9525" cap="flat">
                 <a:solidFill>
                   <a:schemeClr val="tx1"/>
                 </a:solidFill>
@@ -13291,7 +13283,7 @@
           <a:blip r:embed="rId5" cstate="print">
             <a:extLst>
               <a:ext uri="{28A0092B-C50C-407E-A947-70E740481C1C}">
-                <a14:useLocalDpi xmlns:a14="http://schemas.microsoft.com/office/drawing/2010/main" xmlns="" val="0"/>
+                <a14:useLocalDpi xmlns="" xmlns:a14="http://schemas.microsoft.com/office/drawing/2010/main" val="0"/>
               </a:ext>
             </a:extLst>
           </a:blip>
@@ -13314,14 +13306,14 @@
           </a:ln>
           <a:extLst>
             <a:ext uri="{909E8E84-426E-40dd-AFC4-6F175D3DCCD1}">
-              <a14:hiddenFill xmlns:a14="http://schemas.microsoft.com/office/drawing/2010/main" xmlns="">
+              <a14:hiddenFill xmlns="" xmlns:a14="http://schemas.microsoft.com/office/drawing/2010/main">
                 <a:solidFill>
                   <a:srgbClr val="FFFFFF"/>
                 </a:solidFill>
               </a14:hiddenFill>
             </a:ext>
             <a:ext uri="{91240B29-F687-4f45-9708-019B960494DF}">
-              <a14:hiddenLine xmlns:a14="http://schemas.microsoft.com/office/drawing/2010/main" xmlns="" w="9525" cap="flat">
+              <a14:hiddenLine xmlns="" xmlns:a14="http://schemas.microsoft.com/office/drawing/2010/main" w="9525" cap="flat">
                 <a:solidFill>
                   <a:schemeClr val="tx1"/>
                 </a:solidFill>
@@ -13361,7 +13353,7 @@
           </a:ln>
           <a:extLst>
             <a:ext uri="{909E8E84-426E-40dd-AFC4-6F175D3DCCD1}">
-              <a14:hiddenFill xmlns:a14="http://schemas.microsoft.com/office/drawing/2010/main" xmlns="">
+              <a14:hiddenFill xmlns="" xmlns:a14="http://schemas.microsoft.com/office/drawing/2010/main">
                 <a:solidFill>
                   <a:srgbClr val="FFFFFF"/>
                 </a:solidFill>
@@ -13405,7 +13397,7 @@
           </a:ln>
           <a:extLst>
             <a:ext uri="{909E8E84-426E-40dd-AFC4-6F175D3DCCD1}">
-              <a14:hiddenFill xmlns:a14="http://schemas.microsoft.com/office/drawing/2010/main" xmlns="">
+              <a14:hiddenFill xmlns="" xmlns:a14="http://schemas.microsoft.com/office/drawing/2010/main">
                 <a:solidFill>
                   <a:srgbClr val="FFFFFF"/>
                 </a:solidFill>
@@ -13453,7 +13445,7 @@
           </a:ln>
           <a:extLst>
             <a:ext uri="{91240B29-F687-4f45-9708-019B960494DF}">
-              <a14:hiddenLine xmlns:a14="http://schemas.microsoft.com/office/drawing/2010/main" xmlns="" w="9525" cap="flat">
+              <a14:hiddenLine xmlns="" xmlns:a14="http://schemas.microsoft.com/office/drawing/2010/main" w="9525" cap="flat">
                 <a:solidFill>
                   <a:schemeClr val="tx1"/>
                 </a:solidFill>
@@ -13514,7 +13506,7 @@
           </a:ln>
           <a:extLst>
             <a:ext uri="{91240B29-F687-4f45-9708-019B960494DF}">
-              <a14:hiddenLine xmlns:a14="http://schemas.microsoft.com/office/drawing/2010/main" xmlns="" w="9525" cap="flat">
+              <a14:hiddenLine xmlns="" xmlns:a14="http://schemas.microsoft.com/office/drawing/2010/main" w="9525" cap="flat">
                 <a:solidFill>
                   <a:schemeClr val="tx1"/>
                 </a:solidFill>
@@ -13575,7 +13567,7 @@
           </a:ln>
           <a:extLst>
             <a:ext uri="{91240B29-F687-4f45-9708-019B960494DF}">
-              <a14:hiddenLine xmlns:a14="http://schemas.microsoft.com/office/drawing/2010/main" xmlns="" w="9525" cap="flat">
+              <a14:hiddenLine xmlns="" xmlns:a14="http://schemas.microsoft.com/office/drawing/2010/main" w="9525" cap="flat">
                 <a:solidFill>
                   <a:schemeClr val="tx1"/>
                 </a:solidFill>
@@ -13607,7 +13599,7 @@
     </p:spTree>
     <p:extLst>
       <p:ext uri="{BB962C8B-B14F-4D97-AF65-F5344CB8AC3E}">
-        <p14:creationId xmlns:p14="http://schemas.microsoft.com/office/powerpoint/2010/main" xmlns="" val="65706555"/>
+        <p14:creationId xmlns="" xmlns:p14="http://schemas.microsoft.com/office/powerpoint/2010/main" val="65706555"/>
       </p:ext>
     </p:extLst>
   </p:cSld>
@@ -14114,7 +14106,7 @@
           <a:blip r:embed="rId3" cstate="print">
             <a:extLst>
               <a:ext uri="{28A0092B-C50C-407E-A947-70E740481C1C}">
-                <a14:useLocalDpi xmlns:a14="http://schemas.microsoft.com/office/drawing/2010/main" xmlns="" val="0"/>
+                <a14:useLocalDpi xmlns="" xmlns:a14="http://schemas.microsoft.com/office/drawing/2010/main" val="0"/>
               </a:ext>
             </a:extLst>
           </a:blip>
@@ -14137,14 +14129,14 @@
           </a:ln>
           <a:extLst>
             <a:ext uri="{909E8E84-426E-40dd-AFC4-6F175D3DCCD1}">
-              <a14:hiddenFill xmlns:a14="http://schemas.microsoft.com/office/drawing/2010/main" xmlns="">
+              <a14:hiddenFill xmlns="" xmlns:a14="http://schemas.microsoft.com/office/drawing/2010/main">
                 <a:solidFill>
                   <a:srgbClr val="FFFFFF"/>
                 </a:solidFill>
               </a14:hiddenFill>
             </a:ext>
             <a:ext uri="{91240B29-F687-4f45-9708-019B960494DF}">
-              <a14:hiddenLine xmlns:a14="http://schemas.microsoft.com/office/drawing/2010/main" xmlns="" w="9525" cap="flat">
+              <a14:hiddenLine xmlns="" xmlns:a14="http://schemas.microsoft.com/office/drawing/2010/main" w="9525" cap="flat">
                 <a:solidFill>
                   <a:schemeClr val="tx1"/>
                 </a:solidFill>
@@ -14159,7 +14151,7 @@
     </p:spTree>
     <p:extLst>
       <p:ext uri="{BB962C8B-B14F-4D97-AF65-F5344CB8AC3E}">
-        <p14:creationId xmlns:p14="http://schemas.microsoft.com/office/powerpoint/2010/main" xmlns="" val="1731448741"/>
+        <p14:creationId xmlns="" xmlns:p14="http://schemas.microsoft.com/office/powerpoint/2010/main" val="1731448741"/>
       </p:ext>
     </p:extLst>
   </p:cSld>
@@ -14167,7 +14159,7 @@
     <a:masterClrMapping/>
   </p:clrMapOvr>
   <mc:AlternateContent xmlns:mc="http://schemas.openxmlformats.org/markup-compatibility/2006">
-    <mc:Choice xmlns:p14="http://schemas.microsoft.com/office/powerpoint/2010/main" xmlns="" Requires="p14">
+    <mc:Choice xmlns="" xmlns:p14="http://schemas.microsoft.com/office/powerpoint/2010/main" Requires="p14">
       <p:transition spd="slow" p14:dur="2000"/>
     </mc:Choice>
     <mc:Fallback>
@@ -14384,7 +14376,7 @@
           <a:blip r:embed="rId3" cstate="print">
             <a:extLst>
               <a:ext uri="{28A0092B-C50C-407E-A947-70E740481C1C}">
-                <a14:useLocalDpi xmlns:a14="http://schemas.microsoft.com/office/drawing/2010/main" xmlns="" val="0"/>
+                <a14:useLocalDpi xmlns="" xmlns:a14="http://schemas.microsoft.com/office/drawing/2010/main" val="0"/>
               </a:ext>
             </a:extLst>
           </a:blip>
@@ -14407,14 +14399,14 @@
           </a:ln>
           <a:extLst>
             <a:ext uri="{909E8E84-426E-40dd-AFC4-6F175D3DCCD1}">
-              <a14:hiddenFill xmlns:a14="http://schemas.microsoft.com/office/drawing/2010/main" xmlns="">
+              <a14:hiddenFill xmlns="" xmlns:a14="http://schemas.microsoft.com/office/drawing/2010/main">
                 <a:solidFill>
                   <a:srgbClr val="FFFFFF"/>
                 </a:solidFill>
               </a14:hiddenFill>
             </a:ext>
             <a:ext uri="{91240B29-F687-4f45-9708-019B960494DF}">
-              <a14:hiddenLine xmlns:a14="http://schemas.microsoft.com/office/drawing/2010/main" xmlns="" w="9525" cap="flat">
+              <a14:hiddenLine xmlns="" xmlns:a14="http://schemas.microsoft.com/office/drawing/2010/main" w="9525" cap="flat">
                 <a:solidFill>
                   <a:schemeClr val="tx1"/>
                 </a:solidFill>
@@ -14429,7 +14421,7 @@
     </p:spTree>
     <p:extLst>
       <p:ext uri="{BB962C8B-B14F-4D97-AF65-F5344CB8AC3E}">
-        <p14:creationId xmlns:p14="http://schemas.microsoft.com/office/powerpoint/2010/main" xmlns="" val="988935766"/>
+        <p14:creationId xmlns="" xmlns:p14="http://schemas.microsoft.com/office/powerpoint/2010/main" val="988935766"/>
       </p:ext>
     </p:extLst>
   </p:cSld>
@@ -14437,7 +14429,7 @@
     <a:masterClrMapping/>
   </p:clrMapOvr>
   <mc:AlternateContent xmlns:mc="http://schemas.openxmlformats.org/markup-compatibility/2006">
-    <mc:Choice xmlns:p14="http://schemas.microsoft.com/office/powerpoint/2010/main" xmlns="" Requires="p14">
+    <mc:Choice xmlns="" xmlns:p14="http://schemas.microsoft.com/office/powerpoint/2010/main" Requires="p14">
       <p:transition spd="slow" p14:dur="2000"/>
     </mc:Choice>
     <mc:Fallback>
@@ -14483,7 +14475,7 @@
           <a:blip r:embed="rId2" cstate="print">
             <a:extLst>
               <a:ext uri="{28A0092B-C50C-407E-A947-70E740481C1C}">
-                <a14:useLocalDpi xmlns:a14="http://schemas.microsoft.com/office/drawing/2010/main" xmlns="" val="0"/>
+                <a14:useLocalDpi xmlns="" xmlns:a14="http://schemas.microsoft.com/office/drawing/2010/main" val="0"/>
               </a:ext>
             </a:extLst>
           </a:blip>
@@ -14506,14 +14498,14 @@
           </a:ln>
           <a:extLst>
             <a:ext uri="{909E8E84-426E-40dd-AFC4-6F175D3DCCD1}">
-              <a14:hiddenFill xmlns:a14="http://schemas.microsoft.com/office/drawing/2010/main" xmlns="">
+              <a14:hiddenFill xmlns="" xmlns:a14="http://schemas.microsoft.com/office/drawing/2010/main">
                 <a:solidFill>
                   <a:srgbClr val="FFFFFF"/>
                 </a:solidFill>
               </a14:hiddenFill>
             </a:ext>
             <a:ext uri="{91240B29-F687-4f45-9708-019B960494DF}">
-              <a14:hiddenLine xmlns:a14="http://schemas.microsoft.com/office/drawing/2010/main" xmlns="" w="9525" cap="flat">
+              <a14:hiddenLine xmlns="" xmlns:a14="http://schemas.microsoft.com/office/drawing/2010/main" w="9525" cap="flat">
                 <a:solidFill>
                   <a:schemeClr val="tx1"/>
                 </a:solidFill>
@@ -14553,7 +14545,7 @@
           </a:ln>
           <a:extLst>
             <a:ext uri="{909E8E84-426E-40dd-AFC4-6F175D3DCCD1}">
-              <a14:hiddenFill xmlns:a14="http://schemas.microsoft.com/office/drawing/2010/main" xmlns="">
+              <a14:hiddenFill xmlns="" xmlns:a14="http://schemas.microsoft.com/office/drawing/2010/main">
                 <a:solidFill>
                   <a:srgbClr val="FFFFFF"/>
                 </a:solidFill>
@@ -14597,7 +14589,7 @@
           </a:ln>
           <a:extLst>
             <a:ext uri="{909E8E84-426E-40dd-AFC4-6F175D3DCCD1}">
-              <a14:hiddenFill xmlns:a14="http://schemas.microsoft.com/office/drawing/2010/main" xmlns="">
+              <a14:hiddenFill xmlns="" xmlns:a14="http://schemas.microsoft.com/office/drawing/2010/main">
                 <a:solidFill>
                   <a:srgbClr val="FFFFFF"/>
                 </a:solidFill>
@@ -14645,7 +14637,7 @@
           </a:ln>
           <a:extLst>
             <a:ext uri="{91240B29-F687-4f45-9708-019B960494DF}">
-              <a14:hiddenLine xmlns:a14="http://schemas.microsoft.com/office/drawing/2010/main" xmlns="" w="9525" cap="flat">
+              <a14:hiddenLine xmlns="" xmlns:a14="http://schemas.microsoft.com/office/drawing/2010/main" w="9525" cap="flat">
                 <a:solidFill>
                   <a:schemeClr val="tx1"/>
                 </a:solidFill>
@@ -14706,7 +14698,7 @@
           </a:ln>
           <a:extLst>
             <a:ext uri="{91240B29-F687-4f45-9708-019B960494DF}">
-              <a14:hiddenLine xmlns:a14="http://schemas.microsoft.com/office/drawing/2010/main" xmlns="" w="9525" cap="flat">
+              <a14:hiddenLine xmlns="" xmlns:a14="http://schemas.microsoft.com/office/drawing/2010/main" w="9525" cap="flat">
                 <a:solidFill>
                   <a:schemeClr val="tx1"/>
                 </a:solidFill>
@@ -14767,7 +14759,7 @@
           </a:ln>
           <a:extLst>
             <a:ext uri="{91240B29-F687-4f45-9708-019B960494DF}">
-              <a14:hiddenLine xmlns:a14="http://schemas.microsoft.com/office/drawing/2010/main" xmlns="" w="9525" cap="flat">
+              <a14:hiddenLine xmlns="" xmlns:a14="http://schemas.microsoft.com/office/drawing/2010/main" w="9525" cap="flat">
                 <a:solidFill>
                   <a:schemeClr val="tx1"/>
                 </a:solidFill>
@@ -14828,7 +14820,7 @@
           </a:ln>
           <a:extLst>
             <a:ext uri="{91240B29-F687-4f45-9708-019B960494DF}">
-              <a14:hiddenLine xmlns:a14="http://schemas.microsoft.com/office/drawing/2010/main" xmlns="" w="9525" cap="flat">
+              <a14:hiddenLine xmlns="" xmlns:a14="http://schemas.microsoft.com/office/drawing/2010/main" w="9525" cap="flat">
                 <a:solidFill>
                   <a:schemeClr val="tx1"/>
                 </a:solidFill>
@@ -14885,7 +14877,7 @@
           </a:ln>
           <a:extLst>
             <a:ext uri="{909E8E84-426E-40dd-AFC4-6F175D3DCCD1}">
-              <a14:hiddenFill xmlns:a14="http://schemas.microsoft.com/office/drawing/2010/main" xmlns="">
+              <a14:hiddenFill xmlns="" xmlns:a14="http://schemas.microsoft.com/office/drawing/2010/main">
                 <a:solidFill>
                   <a:srgbClr val="FFFFFF"/>
                 </a:solidFill>
@@ -14933,7 +14925,7 @@
           </a:ln>
           <a:extLst>
             <a:ext uri="{91240B29-F687-4f45-9708-019B960494DF}">
-              <a14:hiddenLine xmlns:a14="http://schemas.microsoft.com/office/drawing/2010/main" xmlns="" w="9525" cap="flat">
+              <a14:hiddenLine xmlns="" xmlns:a14="http://schemas.microsoft.com/office/drawing/2010/main" w="9525" cap="flat">
                 <a:solidFill>
                   <a:schemeClr val="tx1"/>
                 </a:solidFill>
@@ -14988,7 +14980,7 @@
     </p:spTree>
     <p:extLst>
       <p:ext uri="{BB962C8B-B14F-4D97-AF65-F5344CB8AC3E}">
-        <p14:creationId xmlns:p14="http://schemas.microsoft.com/office/powerpoint/2010/main" xmlns="" val="3665769119"/>
+        <p14:creationId xmlns="" xmlns:p14="http://schemas.microsoft.com/office/powerpoint/2010/main" val="3665769119"/>
       </p:ext>
     </p:extLst>
   </p:cSld>
@@ -15111,7 +15103,7 @@
     </p:spTree>
     <p:extLst>
       <p:ext uri="{BB962C8B-B14F-4D97-AF65-F5344CB8AC3E}">
-        <p14:creationId xmlns:p14="http://schemas.microsoft.com/office/powerpoint/2010/main" xmlns="" val="746712751"/>
+        <p14:creationId xmlns="" xmlns:p14="http://schemas.microsoft.com/office/powerpoint/2010/main" val="746712751"/>
       </p:ext>
     </p:extLst>
   </p:cSld>
@@ -15157,7 +15149,7 @@
           <a:blip r:embed="rId3" cstate="print">
             <a:extLst>
               <a:ext uri="{28A0092B-C50C-407E-A947-70E740481C1C}">
-                <a14:useLocalDpi xmlns:a14="http://schemas.microsoft.com/office/drawing/2010/main" xmlns="" val="0"/>
+                <a14:useLocalDpi xmlns="" xmlns:a14="http://schemas.microsoft.com/office/drawing/2010/main" val="0"/>
               </a:ext>
             </a:extLst>
           </a:blip>
@@ -15180,14 +15172,14 @@
           </a:ln>
           <a:extLst>
             <a:ext uri="{909E8E84-426E-40dd-AFC4-6F175D3DCCD1}">
-              <a14:hiddenFill xmlns:a14="http://schemas.microsoft.com/office/drawing/2010/main" xmlns="">
+              <a14:hiddenFill xmlns="" xmlns:a14="http://schemas.microsoft.com/office/drawing/2010/main">
                 <a:solidFill>
                   <a:srgbClr val="FFFFFF"/>
                 </a:solidFill>
               </a14:hiddenFill>
             </a:ext>
             <a:ext uri="{91240B29-F687-4f45-9708-019B960494DF}">
-              <a14:hiddenLine xmlns:a14="http://schemas.microsoft.com/office/drawing/2010/main" xmlns="" w="9525" cap="flat">
+              <a14:hiddenLine xmlns="" xmlns:a14="http://schemas.microsoft.com/office/drawing/2010/main" w="9525" cap="flat">
                 <a:solidFill>
                   <a:schemeClr val="tx1"/>
                 </a:solidFill>
@@ -15231,7 +15223,7 @@
           </a:ln>
           <a:extLst>
             <a:ext uri="{91240B29-F687-4f45-9708-019B960494DF}">
-              <a14:hiddenLine xmlns:a14="http://schemas.microsoft.com/office/drawing/2010/main" xmlns="" w="9525" cap="flat">
+              <a14:hiddenLine xmlns="" xmlns:a14="http://schemas.microsoft.com/office/drawing/2010/main" w="9525" cap="flat">
                 <a:solidFill>
                   <a:schemeClr val="tx1"/>
                 </a:solidFill>
@@ -15292,7 +15284,7 @@
           </a:ln>
           <a:extLst>
             <a:ext uri="{91240B29-F687-4f45-9708-019B960494DF}">
-              <a14:hiddenLine xmlns:a14="http://schemas.microsoft.com/office/drawing/2010/main" xmlns="" w="9525" cap="flat">
+              <a14:hiddenLine xmlns="" xmlns:a14="http://schemas.microsoft.com/office/drawing/2010/main" w="9525" cap="flat">
                 <a:solidFill>
                   <a:schemeClr val="tx1"/>
                 </a:solidFill>
@@ -15349,7 +15341,7 @@
           </a:ln>
           <a:extLst>
             <a:ext uri="{909E8E84-426E-40dd-AFC4-6F175D3DCCD1}">
-              <a14:hiddenFill xmlns:a14="http://schemas.microsoft.com/office/drawing/2010/main" xmlns="">
+              <a14:hiddenFill xmlns="" xmlns:a14="http://schemas.microsoft.com/office/drawing/2010/main">
                 <a:solidFill>
                   <a:srgbClr val="FFFFFF"/>
                 </a:solidFill>
@@ -15397,7 +15389,7 @@
           </a:ln>
           <a:extLst>
             <a:ext uri="{91240B29-F687-4f45-9708-019B960494DF}">
-              <a14:hiddenLine xmlns:a14="http://schemas.microsoft.com/office/drawing/2010/main" xmlns="" w="9525" cap="flat">
+              <a14:hiddenLine xmlns="" xmlns:a14="http://schemas.microsoft.com/office/drawing/2010/main" w="9525" cap="flat">
                 <a:solidFill>
                   <a:schemeClr val="tx1"/>
                 </a:solidFill>
@@ -15468,7 +15460,7 @@
           </a:ln>
           <a:extLst>
             <a:ext uri="{91240B29-F687-4f45-9708-019B960494DF}">
-              <a14:hiddenLine xmlns:a14="http://schemas.microsoft.com/office/drawing/2010/main" xmlns="" w="9525" cap="flat">
+              <a14:hiddenLine xmlns="" xmlns:a14="http://schemas.microsoft.com/office/drawing/2010/main" w="9525" cap="flat">
                 <a:solidFill>
                   <a:schemeClr val="tx1"/>
                 </a:solidFill>
@@ -15529,7 +15521,7 @@
           </a:ln>
           <a:extLst>
             <a:ext uri="{91240B29-F687-4f45-9708-019B960494DF}">
-              <a14:hiddenLine xmlns:a14="http://schemas.microsoft.com/office/drawing/2010/main" xmlns="" w="9525" cap="flat">
+              <a14:hiddenLine xmlns="" xmlns:a14="http://schemas.microsoft.com/office/drawing/2010/main" w="9525" cap="flat">
                 <a:solidFill>
                   <a:schemeClr val="tx1"/>
                 </a:solidFill>
@@ -15590,7 +15582,7 @@
           </a:ln>
           <a:extLst>
             <a:ext uri="{91240B29-F687-4f45-9708-019B960494DF}">
-              <a14:hiddenLine xmlns:a14="http://schemas.microsoft.com/office/drawing/2010/main" xmlns="" w="9525" cap="flat">
+              <a14:hiddenLine xmlns="" xmlns:a14="http://schemas.microsoft.com/office/drawing/2010/main" w="9525" cap="flat">
                 <a:solidFill>
                   <a:schemeClr val="tx1"/>
                 </a:solidFill>
@@ -15651,7 +15643,7 @@
           </a:ln>
           <a:extLst>
             <a:ext uri="{91240B29-F687-4f45-9708-019B960494DF}">
-              <a14:hiddenLine xmlns:a14="http://schemas.microsoft.com/office/drawing/2010/main" xmlns="" w="9525" cap="flat">
+              <a14:hiddenLine xmlns="" xmlns:a14="http://schemas.microsoft.com/office/drawing/2010/main" w="9525" cap="flat">
                 <a:solidFill>
                   <a:schemeClr val="tx1"/>
                 </a:solidFill>
@@ -15712,7 +15704,7 @@
           </a:ln>
           <a:extLst>
             <a:ext uri="{91240B29-F687-4f45-9708-019B960494DF}">
-              <a14:hiddenLine xmlns:a14="http://schemas.microsoft.com/office/drawing/2010/main" xmlns="" w="9525" cap="flat">
+              <a14:hiddenLine xmlns="" xmlns:a14="http://schemas.microsoft.com/office/drawing/2010/main" w="9525" cap="flat">
                 <a:solidFill>
                   <a:schemeClr val="tx1"/>
                 </a:solidFill>
@@ -15773,7 +15765,7 @@
           </a:ln>
           <a:extLst>
             <a:ext uri="{91240B29-F687-4f45-9708-019B960494DF}">
-              <a14:hiddenLine xmlns:a14="http://schemas.microsoft.com/office/drawing/2010/main" xmlns="" w="9525" cap="flat">
+              <a14:hiddenLine xmlns="" xmlns:a14="http://schemas.microsoft.com/office/drawing/2010/main" w="9525" cap="flat">
                 <a:solidFill>
                   <a:schemeClr val="tx1"/>
                 </a:solidFill>
@@ -15834,7 +15826,7 @@
           </a:ln>
           <a:extLst>
             <a:ext uri="{91240B29-F687-4f45-9708-019B960494DF}">
-              <a14:hiddenLine xmlns:a14="http://schemas.microsoft.com/office/drawing/2010/main" xmlns="" w="9525" cap="flat">
+              <a14:hiddenLine xmlns="" xmlns:a14="http://schemas.microsoft.com/office/drawing/2010/main" w="9525" cap="flat">
                 <a:solidFill>
                   <a:schemeClr val="tx1"/>
                 </a:solidFill>
@@ -15891,7 +15883,7 @@
           </a:ln>
           <a:extLst>
             <a:ext uri="{909E8E84-426E-40dd-AFC4-6F175D3DCCD1}">
-              <a14:hiddenFill xmlns:a14="http://schemas.microsoft.com/office/drawing/2010/main" xmlns="">
+              <a14:hiddenFill xmlns="" xmlns:a14="http://schemas.microsoft.com/office/drawing/2010/main">
                 <a:solidFill>
                   <a:srgbClr val="FFFFFF"/>
                 </a:solidFill>
@@ -15939,7 +15931,7 @@
           </a:ln>
           <a:extLst>
             <a:ext uri="{91240B29-F687-4f45-9708-019B960494DF}">
-              <a14:hiddenLine xmlns:a14="http://schemas.microsoft.com/office/drawing/2010/main" xmlns="" w="9525" cap="flat">
+              <a14:hiddenLine xmlns="" xmlns:a14="http://schemas.microsoft.com/office/drawing/2010/main" w="9525" cap="flat">
                 <a:solidFill>
                   <a:schemeClr val="tx1"/>
                 </a:solidFill>
@@ -16023,7 +16015,7 @@
           </a:ln>
           <a:extLst>
             <a:ext uri="{91240B29-F687-4f45-9708-019B960494DF}">
-              <a14:hiddenLine xmlns:a14="http://schemas.microsoft.com/office/drawing/2010/main" xmlns="" w="9525" cap="flat">
+              <a14:hiddenLine xmlns="" xmlns:a14="http://schemas.microsoft.com/office/drawing/2010/main" w="9525" cap="flat">
                 <a:solidFill>
                   <a:schemeClr val="tx1"/>
                 </a:solidFill>
@@ -16101,7 +16093,7 @@
           </a:ln>
           <a:extLst>
             <a:ext uri="{91240B29-F687-4f45-9708-019B960494DF}">
-              <a14:hiddenLine xmlns:a14="http://schemas.microsoft.com/office/drawing/2010/main" xmlns="" w="9525" cap="flat">
+              <a14:hiddenLine xmlns="" xmlns:a14="http://schemas.microsoft.com/office/drawing/2010/main" w="9525" cap="flat">
                 <a:solidFill>
                   <a:schemeClr val="tx1"/>
                 </a:solidFill>
@@ -16179,7 +16171,7 @@
           </a:ln>
           <a:extLst>
             <a:ext uri="{91240B29-F687-4f45-9708-019B960494DF}">
-              <a14:hiddenLine xmlns:a14="http://schemas.microsoft.com/office/drawing/2010/main" xmlns="" w="9525" cap="flat">
+              <a14:hiddenLine xmlns="" xmlns:a14="http://schemas.microsoft.com/office/drawing/2010/main" w="9525" cap="flat">
                 <a:solidFill>
                   <a:schemeClr val="tx1"/>
                 </a:solidFill>
@@ -16211,7 +16203,7 @@
     </p:spTree>
     <p:extLst>
       <p:ext uri="{BB962C8B-B14F-4D97-AF65-F5344CB8AC3E}">
-        <p14:creationId xmlns:p14="http://schemas.microsoft.com/office/powerpoint/2010/main" xmlns="" val="1254146464"/>
+        <p14:creationId xmlns="" xmlns:p14="http://schemas.microsoft.com/office/powerpoint/2010/main" val="1254146464"/>
       </p:ext>
     </p:extLst>
   </p:cSld>
@@ -17085,7 +17077,7 @@
     </p:spTree>
     <p:extLst>
       <p:ext uri="{BB962C8B-B14F-4D97-AF65-F5344CB8AC3E}">
-        <p14:creationId xmlns:p14="http://schemas.microsoft.com/office/powerpoint/2010/main" xmlns="" val="2263852878"/>
+        <p14:creationId xmlns="" xmlns:p14="http://schemas.microsoft.com/office/powerpoint/2010/main" val="2263852878"/>
       </p:ext>
     </p:extLst>
   </p:cSld>
@@ -17093,7 +17085,7 @@
     <a:masterClrMapping/>
   </p:clrMapOvr>
   <mc:AlternateContent xmlns:mc="http://schemas.openxmlformats.org/markup-compatibility/2006">
-    <mc:Choice xmlns:p14="http://schemas.microsoft.com/office/powerpoint/2010/main" xmlns="" Requires="p14">
+    <mc:Choice xmlns="" xmlns:p14="http://schemas.microsoft.com/office/powerpoint/2010/main" Requires="p14">
       <p:transition spd="slow" p14:dur="2000"/>
     </mc:Choice>
     <mc:Fallback>
@@ -17252,7 +17244,7 @@
     </p:spTree>
     <p:extLst>
       <p:ext uri="{BB962C8B-B14F-4D97-AF65-F5344CB8AC3E}">
-        <p14:creationId xmlns:p14="http://schemas.microsoft.com/office/powerpoint/2010/main" xmlns="" val="1866537602"/>
+        <p14:creationId xmlns="" xmlns:p14="http://schemas.microsoft.com/office/powerpoint/2010/main" val="1866537602"/>
       </p:ext>
     </p:extLst>
   </p:cSld>
@@ -17260,7 +17252,7 @@
     <a:masterClrMapping/>
   </p:clrMapOvr>
   <mc:AlternateContent xmlns:mc="http://schemas.openxmlformats.org/markup-compatibility/2006">
-    <mc:Choice xmlns:p14="http://schemas.microsoft.com/office/powerpoint/2010/main" xmlns="" Requires="p14">
+    <mc:Choice xmlns="" xmlns:p14="http://schemas.microsoft.com/office/powerpoint/2010/main" Requires="p14">
       <p:transition spd="slow" p14:dur="2000"/>
     </mc:Choice>
     <mc:Fallback>
@@ -17446,7 +17438,7 @@
     </p:spTree>
     <p:extLst>
       <p:ext uri="{BB962C8B-B14F-4D97-AF65-F5344CB8AC3E}">
-        <p14:creationId xmlns:p14="http://schemas.microsoft.com/office/powerpoint/2010/main" xmlns="" val="4045749764"/>
+        <p14:creationId xmlns="" xmlns:p14="http://schemas.microsoft.com/office/powerpoint/2010/main" val="4045749764"/>
       </p:ext>
     </p:extLst>
   </p:cSld>
@@ -17454,7 +17446,7 @@
     <a:masterClrMapping/>
   </p:clrMapOvr>
   <mc:AlternateContent xmlns:mc="http://schemas.openxmlformats.org/markup-compatibility/2006">
-    <mc:Choice xmlns:p14="http://schemas.microsoft.com/office/powerpoint/2010/main" xmlns="" Requires="p14">
+    <mc:Choice xmlns="" xmlns:p14="http://schemas.microsoft.com/office/powerpoint/2010/main" Requires="p14">
       <p:transition spd="slow" p14:dur="2000"/>
     </mc:Choice>
     <mc:Fallback>
@@ -17600,7 +17592,7 @@
     </p:spTree>
     <p:extLst>
       <p:ext uri="{BB962C8B-B14F-4D97-AF65-F5344CB8AC3E}">
-        <p14:creationId xmlns:p14="http://schemas.microsoft.com/office/powerpoint/2010/main" xmlns="" val="529436751"/>
+        <p14:creationId xmlns="" xmlns:p14="http://schemas.microsoft.com/office/powerpoint/2010/main" val="529436751"/>
       </p:ext>
     </p:extLst>
   </p:cSld>
@@ -17608,7 +17600,7 @@
     <a:masterClrMapping/>
   </p:clrMapOvr>
   <mc:AlternateContent xmlns:mc="http://schemas.openxmlformats.org/markup-compatibility/2006">
-    <mc:Choice xmlns:p14="http://schemas.microsoft.com/office/powerpoint/2010/main" xmlns="" Requires="p14">
+    <mc:Choice xmlns="" xmlns:p14="http://schemas.microsoft.com/office/powerpoint/2010/main" Requires="p14">
       <p:transition spd="slow" p14:dur="2000"/>
     </mc:Choice>
     <mc:Fallback>
@@ -17759,7 +17751,7 @@
     </p:spTree>
     <p:extLst>
       <p:ext uri="{BB962C8B-B14F-4D97-AF65-F5344CB8AC3E}">
-        <p14:creationId xmlns:p14="http://schemas.microsoft.com/office/powerpoint/2010/main" xmlns="" val="906832562"/>
+        <p14:creationId xmlns="" xmlns:p14="http://schemas.microsoft.com/office/powerpoint/2010/main" val="906832562"/>
       </p:ext>
     </p:extLst>
   </p:cSld>
@@ -17767,7 +17759,7 @@
     <a:masterClrMapping/>
   </p:clrMapOvr>
   <mc:AlternateContent xmlns:mc="http://schemas.openxmlformats.org/markup-compatibility/2006">
-    <mc:Choice xmlns:p14="http://schemas.microsoft.com/office/powerpoint/2010/main" xmlns="" Requires="p14">
+    <mc:Choice xmlns="" xmlns:p14="http://schemas.microsoft.com/office/powerpoint/2010/main" Requires="p14">
       <p:transition spd="slow" p14:dur="2000"/>
     </mc:Choice>
     <mc:Fallback>
@@ -17846,18 +17838,27 @@
           <a:p>
             <a:r>
               <a:rPr lang="en-US" dirty="0" smtClean="0"/>
-              <a:t>Create WebSocket Client/Endpoints</a:t>
-            </a:r>
+              <a:t>Create </a:t>
+            </a:r>
+            <a:r>
+              <a:rPr lang="en-US" dirty="0" err="1" smtClean="0"/>
+              <a:t>WebSocket</a:t>
+            </a:r>
+            <a:r>
+              <a:rPr lang="en-US" dirty="0" smtClean="0"/>
+              <a:t> </a:t>
+            </a:r>
+            <a:r>
+              <a:rPr lang="en-US" dirty="0" smtClean="0"/>
+              <a:t>Client- and Server Endpoints</a:t>
+            </a:r>
+            <a:endParaRPr lang="en-US" dirty="0" smtClean="0"/>
           </a:p>
           <a:p>
             <a:pPr lvl="1"/>
             <a:r>
               <a:rPr lang="en-US" dirty="0" smtClean="0"/>
-              <a:t>Annotation-driven </a:t>
-            </a:r>
-            <a:r>
-              <a:rPr lang="en-US" dirty="0" smtClean="0"/>
-              <a:t>(</a:t>
+              <a:t>Annotation-driven (</a:t>
             </a:r>
             <a:r>
               <a:rPr lang="en-US" dirty="0" smtClean="0">
@@ -17874,9 +17875,24 @@
               <a:t>ServerEndpoint</a:t>
             </a:r>
             <a:r>
+              <a:rPr lang="en-US" dirty="0" smtClean="0">
+                <a:latin typeface="Courier"/>
+                <a:cs typeface="Courier"/>
+              </a:rPr>
+              <a:t>, @</a:t>
+            </a:r>
+            <a:r>
+              <a:rPr lang="en-US" dirty="0" err="1" smtClean="0">
+                <a:latin typeface="Courier"/>
+                <a:cs typeface="Courier"/>
+              </a:rPr>
+              <a:t>ClientEndpoint</a:t>
+            </a:r>
+            <a:r>
               <a:rPr lang="en-US" dirty="0" smtClean="0"/>
               <a:t>)</a:t>
             </a:r>
+            <a:endParaRPr lang="en-US" dirty="0" smtClean="0"/>
           </a:p>
           <a:p>
             <a:pPr lvl="1"/>
@@ -17923,7 +17939,7 @@
     </p:spTree>
     <p:extLst>
       <p:ext uri="{BB962C8B-B14F-4D97-AF65-F5344CB8AC3E}">
-        <p14:creationId xmlns:p14="http://schemas.microsoft.com/office/powerpoint/2010/main" xmlns="" val="3027221493"/>
+        <p14:creationId xmlns="" xmlns:p14="http://schemas.microsoft.com/office/powerpoint/2010/main" val="3027221493"/>
       </p:ext>
     </p:extLst>
   </p:cSld>
@@ -17931,7 +17947,7 @@
     <a:masterClrMapping/>
   </p:clrMapOvr>
   <mc:AlternateContent xmlns:mc="http://schemas.openxmlformats.org/markup-compatibility/2006">
-    <mc:Choice xmlns:p14="http://schemas.microsoft.com/office/powerpoint/2010/main" xmlns="" Requires="p14">
+    <mc:Choice xmlns="" xmlns:p14="http://schemas.microsoft.com/office/powerpoint/2010/main" Requires="p14">
       <p:transition spd="slow" p14:dur="2000"/>
     </mc:Choice>
     <mc:Fallback>
@@ -17977,7 +17993,7 @@
           <a:blip r:embed="rId3" cstate="print">
             <a:extLst>
               <a:ext uri="{28A0092B-C50C-407E-A947-70E740481C1C}">
-                <a14:useLocalDpi xmlns:a14="http://schemas.microsoft.com/office/drawing/2010/main" xmlns="" val="0"/>
+                <a14:useLocalDpi xmlns="" xmlns:a14="http://schemas.microsoft.com/office/drawing/2010/main" val="0"/>
               </a:ext>
             </a:extLst>
           </a:blip>
@@ -18000,14 +18016,14 @@
           </a:ln>
           <a:extLst>
             <a:ext uri="{909E8E84-426E-40dd-AFC4-6F175D3DCCD1}">
-              <a14:hiddenFill xmlns:a14="http://schemas.microsoft.com/office/drawing/2010/main" xmlns="">
+              <a14:hiddenFill xmlns="" xmlns:a14="http://schemas.microsoft.com/office/drawing/2010/main">
                 <a:solidFill>
                   <a:srgbClr val="FFFFFF"/>
                 </a:solidFill>
               </a14:hiddenFill>
             </a:ext>
             <a:ext uri="{91240B29-F687-4f45-9708-019B960494DF}">
-              <a14:hiddenLine xmlns:a14="http://schemas.microsoft.com/office/drawing/2010/main" xmlns="" w="9525" cap="flat">
+              <a14:hiddenLine xmlns="" xmlns:a14="http://schemas.microsoft.com/office/drawing/2010/main" w="9525" cap="flat">
                 <a:solidFill>
                   <a:schemeClr val="tx1"/>
                 </a:solidFill>
@@ -18070,14 +18086,14 @@
           </a:ln>
           <a:extLst>
             <a:ext uri="{909E8E84-426E-40dd-AFC4-6F175D3DCCD1}">
-              <a14:hiddenFill xmlns:a14="http://schemas.microsoft.com/office/drawing/2010/main" xmlns="">
+              <a14:hiddenFill xmlns="" xmlns:a14="http://schemas.microsoft.com/office/drawing/2010/main">
                 <a:solidFill>
                   <a:srgbClr val="FFFFFF"/>
                 </a:solidFill>
               </a14:hiddenFill>
             </a:ext>
             <a:ext uri="{91240B29-F687-4f45-9708-019B960494DF}">
-              <a14:hiddenLine xmlns:a14="http://schemas.microsoft.com/office/drawing/2010/main" xmlns="" w="12700" cap="flat">
+              <a14:hiddenLine xmlns="" xmlns:a14="http://schemas.microsoft.com/office/drawing/2010/main" w="12700" cap="flat">
                 <a:solidFill>
                   <a:schemeClr val="tx1"/>
                 </a:solidFill>
@@ -18594,7 +18610,7 @@
     </p:spTree>
     <p:extLst>
       <p:ext uri="{BB962C8B-B14F-4D97-AF65-F5344CB8AC3E}">
-        <p14:creationId xmlns:p14="http://schemas.microsoft.com/office/powerpoint/2010/main" xmlns="" val="3936077324"/>
+        <p14:creationId xmlns="" xmlns:p14="http://schemas.microsoft.com/office/powerpoint/2010/main" val="3936077324"/>
       </p:ext>
     </p:extLst>
   </p:cSld>
@@ -18643,7 +18659,7 @@
           <a:blip r:embed="rId2" cstate="print">
             <a:extLst>
               <a:ext uri="{28A0092B-C50C-407E-A947-70E740481C1C}">
-                <a14:useLocalDpi xmlns:a14="http://schemas.microsoft.com/office/drawing/2010/main" xmlns="" val="0"/>
+                <a14:useLocalDpi xmlns="" xmlns:a14="http://schemas.microsoft.com/office/drawing/2010/main" val="0"/>
               </a:ext>
             </a:extLst>
           </a:blip>
@@ -18666,14 +18682,14 @@
           </a:ln>
           <a:extLst>
             <a:ext uri="{909E8E84-426E-40dd-AFC4-6F175D3DCCD1}">
-              <a14:hiddenFill xmlns:a14="http://schemas.microsoft.com/office/drawing/2010/main" xmlns="">
+              <a14:hiddenFill xmlns="" xmlns:a14="http://schemas.microsoft.com/office/drawing/2010/main">
                 <a:solidFill>
                   <a:srgbClr val="FFFFFF"/>
                 </a:solidFill>
               </a14:hiddenFill>
             </a:ext>
             <a:ext uri="{91240B29-F687-4f45-9708-019B960494DF}">
-              <a14:hiddenLine xmlns:a14="http://schemas.microsoft.com/office/drawing/2010/main" xmlns="" w="9525" cap="flat">
+              <a14:hiddenLine xmlns="" xmlns:a14="http://schemas.microsoft.com/office/drawing/2010/main" w="9525" cap="flat">
                 <a:solidFill>
                   <a:schemeClr val="tx1"/>
                 </a:solidFill>
@@ -18736,14 +18752,14 @@
           </a:ln>
           <a:extLst>
             <a:ext uri="{909E8E84-426E-40dd-AFC4-6F175D3DCCD1}">
-              <a14:hiddenFill xmlns:a14="http://schemas.microsoft.com/office/drawing/2010/main" xmlns="">
+              <a14:hiddenFill xmlns="" xmlns:a14="http://schemas.microsoft.com/office/drawing/2010/main">
                 <a:solidFill>
                   <a:srgbClr val="FFFFFF"/>
                 </a:solidFill>
               </a14:hiddenFill>
             </a:ext>
             <a:ext uri="{91240B29-F687-4f45-9708-019B960494DF}">
-              <a14:hiddenLine xmlns:a14="http://schemas.microsoft.com/office/drawing/2010/main" xmlns="" w="12700" cap="flat">
+              <a14:hiddenLine xmlns="" xmlns:a14="http://schemas.microsoft.com/office/drawing/2010/main" w="12700" cap="flat">
                 <a:solidFill>
                   <a:schemeClr val="tx1"/>
                 </a:solidFill>
@@ -19197,7 +19213,7 @@
     </p:spTree>
     <p:extLst>
       <p:ext uri="{BB962C8B-B14F-4D97-AF65-F5344CB8AC3E}">
-        <p14:creationId xmlns:p14="http://schemas.microsoft.com/office/powerpoint/2010/main" xmlns="" val="536888308"/>
+        <p14:creationId xmlns="" xmlns:p14="http://schemas.microsoft.com/office/powerpoint/2010/main" val="536888308"/>
       </p:ext>
     </p:extLst>
   </p:cSld>
@@ -19337,67 +19353,31 @@
                 <a:cs typeface="Courier New"/>
                 <a:sym typeface="Courier New Bold" charset="0"/>
               </a:rPr>
-              <a:t>	</a:t>
+              <a:t>			</a:t>
             </a:r>
             <a:r>
               <a:rPr lang="en-US" b="1" dirty="0" smtClean="0">
                 <a:solidFill>
-                  <a:schemeClr val="tx1"/>
+                  <a:srgbClr val="FF8000"/>
                 </a:solidFill>
                 <a:latin typeface="Courier New"/>
                 <a:ea typeface="ＭＳ Ｐゴシック" charset="0"/>
                 <a:cs typeface="Courier New"/>
                 <a:sym typeface="Courier New Bold" charset="0"/>
               </a:rPr>
-              <a:t>		</a:t>
+              <a:t>value</a:t>
             </a:r>
             <a:r>
               <a:rPr lang="en-US" b="1" dirty="0" smtClean="0">
                 <a:solidFill>
-                  <a:srgbClr val="FF8000"/>
+                  <a:schemeClr val="tx1"/>
                 </a:solidFill>
                 <a:latin typeface="Courier New"/>
                 <a:ea typeface="ＭＳ Ｐゴシック" charset="0"/>
                 <a:cs typeface="Courier New"/>
                 <a:sym typeface="Courier New Bold" charset="0"/>
               </a:rPr>
-              <a:t>value</a:t>
-            </a:r>
-            <a:r>
-              <a:rPr lang="en-US" b="1" dirty="0" smtClean="0">
-                <a:solidFill>
-                  <a:schemeClr val="tx1"/>
-                </a:solidFill>
-                <a:latin typeface="Courier New"/>
-                <a:ea typeface="ＭＳ Ｐゴシック" charset="0"/>
-                <a:cs typeface="Courier New"/>
-                <a:sym typeface="Courier New Bold" charset="0"/>
-              </a:rPr>
-              <a:t> 		 = </a:t>
-            </a:r>
-            <a:r>
-              <a:rPr lang="en-US" b="1" dirty="0" smtClean="0">
-                <a:solidFill>
-                  <a:schemeClr val="tx1"/>
-                </a:solidFill>
-                <a:latin typeface="Courier New"/>
-                <a:ea typeface="ＭＳ Ｐゴシック" charset="0"/>
-                <a:cs typeface="Courier New"/>
-                <a:sym typeface="Courier New Bold" charset="0"/>
-              </a:rPr>
-              <a:t>"/</a:t>
-            </a:r>
-            <a:r>
-              <a:rPr lang="en-US" b="1" dirty="0" smtClean="0">
-                <a:solidFill>
-                  <a:schemeClr val="tx1"/>
-                </a:solidFill>
-                <a:latin typeface="Courier New"/>
-                <a:ea typeface="ＭＳ Ｐゴシック" charset="0"/>
-                <a:cs typeface="Courier New"/>
-                <a:sym typeface="Courier New Bold" charset="0"/>
-              </a:rPr>
-              <a:t>hello”,</a:t>
+              <a:t> 		 = "/hello”,</a:t>
             </a:r>
           </a:p>
           <a:p>
@@ -19636,19 +19616,7 @@
                 <a:cs typeface="Courier New"/>
                 <a:sym typeface="Courier New Bold" charset="0"/>
               </a:rPr>
-              <a:t>    </a:t>
-            </a:r>
-            <a:r>
-              <a:rPr lang="en-US" b="1" dirty="0" smtClean="0">
-                <a:solidFill>
-                  <a:schemeClr val="tx1"/>
-                </a:solidFill>
-                <a:latin typeface="Courier New"/>
-                <a:ea typeface="ＭＳ Ｐゴシック" charset="0"/>
-                <a:cs typeface="Courier New"/>
-                <a:sym typeface="Courier New Bold" charset="0"/>
-              </a:rPr>
-              <a:t>@</a:t>
+              <a:t>    @</a:t>
             </a:r>
             <a:r>
               <a:rPr lang="en-US" b="1" dirty="0" err="1" smtClean="0">
@@ -19911,7 +19879,7 @@
     </p:spTree>
     <p:extLst>
       <p:ext uri="{BB962C8B-B14F-4D97-AF65-F5344CB8AC3E}">
-        <p14:creationId xmlns:p14="http://schemas.microsoft.com/office/powerpoint/2010/main" xmlns="" val="3837757921"/>
+        <p14:creationId xmlns="" xmlns:p14="http://schemas.microsoft.com/office/powerpoint/2010/main" val="3837757921"/>
       </p:ext>
     </p:extLst>
   </p:cSld>
@@ -19919,7 +19887,7 @@
     <a:masterClrMapping/>
   </p:clrMapOvr>
   <mc:AlternateContent xmlns:mc="http://schemas.openxmlformats.org/markup-compatibility/2006">
-    <mc:Choice xmlns:p14="http://schemas.microsoft.com/office/powerpoint/2010/main" xmlns="" Requires="p14">
+    <mc:Choice xmlns="" xmlns:p14="http://schemas.microsoft.com/office/powerpoint/2010/main" Requires="p14">
       <p:transition spd="slow" p14:dur="2000"/>
     </mc:Choice>
     <mc:Fallback>
@@ -20047,88 +20015,15 @@
                   <a:schemeClr val="tx1"/>
                 </a:solidFill>
               </a:rPr>
-              <a:t> 4.0-b57</a:t>
-            </a:r>
-          </a:p>
-          <a:p>
-            <a:pPr lvl="1"/>
+              <a:t> </a:t>
+            </a:r>
             <a:r>
               <a:rPr lang="en-US" dirty="0" smtClean="0">
                 <a:solidFill>
                   <a:schemeClr val="tx1"/>
                 </a:solidFill>
               </a:rPr>
-              <a:t>JDK 7u09</a:t>
-            </a:r>
-          </a:p>
-          <a:p>
-            <a:pPr lvl="1"/>
-            <a:r>
-              <a:rPr lang="en-US" dirty="0" err="1" smtClean="0">
-                <a:solidFill>
-                  <a:schemeClr val="tx1"/>
-                </a:solidFill>
-              </a:rPr>
-              <a:t>NetBeans</a:t>
-            </a:r>
-            <a:r>
-              <a:rPr lang="en-US" dirty="0" smtClean="0">
-                <a:solidFill>
-                  <a:schemeClr val="tx1"/>
-                </a:solidFill>
-              </a:rPr>
-              <a:t> 7.2.1</a:t>
-            </a:r>
-          </a:p>
-          <a:p>
-            <a:pPr lvl="2"/>
-            <a:r>
-              <a:rPr lang="en-US" dirty="0" smtClean="0">
-                <a:solidFill>
-                  <a:schemeClr val="tx1"/>
-                </a:solidFill>
-              </a:rPr>
-              <a:t>Follow Appendix in lab-</a:t>
-            </a:r>
-            <a:r>
-              <a:rPr lang="en-US" dirty="0" err="1" smtClean="0">
-                <a:solidFill>
-                  <a:schemeClr val="tx1"/>
-                </a:solidFill>
-              </a:rPr>
-              <a:t>guide.pdf</a:t>
-            </a:r>
-            <a:r>
-              <a:rPr lang="en-US" dirty="0" smtClean="0">
-                <a:solidFill>
-                  <a:schemeClr val="tx1"/>
-                </a:solidFill>
-              </a:rPr>
-              <a:t> to register </a:t>
-            </a:r>
-            <a:r>
-              <a:rPr lang="en-US" dirty="0" err="1" smtClean="0">
-                <a:solidFill>
-                  <a:schemeClr val="tx1"/>
-                </a:solidFill>
-              </a:rPr>
-              <a:t>GlassFish</a:t>
-            </a:r>
-            <a:r>
-              <a:rPr lang="en-US" dirty="0" smtClean="0">
-                <a:solidFill>
-                  <a:schemeClr val="tx1"/>
-                </a:solidFill>
-              </a:rPr>
-              <a:t> in </a:t>
-            </a:r>
-            <a:r>
-              <a:rPr lang="en-US" dirty="0" err="1" smtClean="0">
-                <a:solidFill>
-                  <a:schemeClr val="tx1"/>
-                </a:solidFill>
-              </a:rPr>
-              <a:t>NetBeans</a:t>
+              <a:t>4.0-b84</a:t>
             </a:r>
             <a:endParaRPr lang="en-US" dirty="0" smtClean="0">
               <a:solidFill>
@@ -20137,6 +20032,65 @@
             </a:endParaRPr>
           </a:p>
           <a:p>
+            <a:pPr lvl="1"/>
+            <a:r>
+              <a:rPr lang="en-US" dirty="0" smtClean="0">
+                <a:solidFill>
+                  <a:schemeClr val="tx1"/>
+                </a:solidFill>
+              </a:rPr>
+              <a:t>JDK </a:t>
+            </a:r>
+            <a:r>
+              <a:rPr lang="en-US" dirty="0" smtClean="0">
+                <a:solidFill>
+                  <a:schemeClr val="tx1"/>
+                </a:solidFill>
+              </a:rPr>
+              <a:t>7u21</a:t>
+            </a:r>
+            <a:endParaRPr lang="en-US" dirty="0" smtClean="0">
+              <a:solidFill>
+                <a:schemeClr val="tx1"/>
+              </a:solidFill>
+            </a:endParaRPr>
+          </a:p>
+          <a:p>
+            <a:pPr lvl="1"/>
+            <a:r>
+              <a:rPr lang="en-US" dirty="0" err="1" smtClean="0">
+                <a:solidFill>
+                  <a:schemeClr val="tx1"/>
+                </a:solidFill>
+              </a:rPr>
+              <a:t>NetBeans</a:t>
+            </a:r>
+            <a:r>
+              <a:rPr lang="en-US" dirty="0" smtClean="0">
+                <a:solidFill>
+                  <a:schemeClr val="tx1"/>
+                </a:solidFill>
+              </a:rPr>
+              <a:t> </a:t>
+            </a:r>
+            <a:r>
+              <a:rPr lang="en-US" dirty="0" smtClean="0">
+                <a:solidFill>
+                  <a:schemeClr val="tx1"/>
+                </a:solidFill>
+              </a:rPr>
+              <a:t>7.3</a:t>
+            </a:r>
+            <a:endParaRPr lang="en-US" dirty="0" smtClean="0">
+              <a:solidFill>
+                <a:schemeClr val="tx1"/>
+              </a:solidFill>
+            </a:endParaRPr>
+          </a:p>
+          <a:p>
+            <a:pPr>
+              <a:buNone/>
+            </a:pPr>
             <a:endParaRPr lang="en-US" dirty="0" smtClean="0"/>
           </a:p>
         </p:txBody>
@@ -20144,7 +20098,7 @@
     </p:spTree>
     <p:extLst>
       <p:ext uri="{BB962C8B-B14F-4D97-AF65-F5344CB8AC3E}">
-        <p14:creationId xmlns:p14="http://schemas.microsoft.com/office/powerpoint/2010/main" xmlns="" val="1695357243"/>
+        <p14:creationId xmlns="" xmlns:p14="http://schemas.microsoft.com/office/powerpoint/2010/main" val="1695357243"/>
       </p:ext>
     </p:extLst>
   </p:cSld>
@@ -20628,7 +20582,7 @@
     </p:spTree>
     <p:extLst>
       <p:ext uri="{BB962C8B-B14F-4D97-AF65-F5344CB8AC3E}">
-        <p14:creationId xmlns:p14="http://schemas.microsoft.com/office/powerpoint/2010/main" xmlns="" val="3071677459"/>
+        <p14:creationId xmlns="" xmlns:p14="http://schemas.microsoft.com/office/powerpoint/2010/main" val="3071677459"/>
       </p:ext>
     </p:extLst>
   </p:cSld>
@@ -20636,7 +20590,7 @@
     <a:masterClrMapping/>
   </p:clrMapOvr>
   <mc:AlternateContent xmlns:mc="http://schemas.openxmlformats.org/markup-compatibility/2006">
-    <mc:Choice xmlns:p14="http://schemas.microsoft.com/office/powerpoint/2010/main" xmlns="" Requires="p14">
+    <mc:Choice xmlns="" xmlns:p14="http://schemas.microsoft.com/office/powerpoint/2010/main" Requires="p14">
       <p:transition spd="slow" p14:dur="2000"/>
     </mc:Choice>
     <mc:Fallback>
@@ -21393,20 +21347,15 @@
             </a:r>
             <a:r>
               <a:rPr lang="en-US" dirty="0" smtClean="0"/>
-              <a:t>), Text (String/Reader) </a:t>
-            </a:r>
-            <a:r>
-              <a:rPr lang="en-US" dirty="0" smtClean="0"/>
-              <a:t>messages</a:t>
-            </a:r>
-            <a:endParaRPr lang="en-US" dirty="0" smtClean="0"/>
+              <a:t>), Text (String/Reader) messages</a:t>
+            </a:r>
           </a:p>
         </p:txBody>
       </p:sp>
     </p:spTree>
     <p:extLst>
       <p:ext uri="{BB962C8B-B14F-4D97-AF65-F5344CB8AC3E}">
-        <p14:creationId xmlns:p14="http://schemas.microsoft.com/office/powerpoint/2010/main" xmlns="" val="622993623"/>
+        <p14:creationId xmlns="" xmlns:p14="http://schemas.microsoft.com/office/powerpoint/2010/main" val="622993623"/>
       </p:ext>
     </p:extLst>
   </p:cSld>
@@ -21414,7 +21363,7 @@
     <a:masterClrMapping/>
   </p:clrMapOvr>
   <mc:AlternateContent xmlns:mc="http://schemas.openxmlformats.org/markup-compatibility/2006">
-    <mc:Choice xmlns:p14="http://schemas.microsoft.com/office/powerpoint/2010/main" xmlns="" Requires="p14">
+    <mc:Choice xmlns="" xmlns:p14="http://schemas.microsoft.com/office/powerpoint/2010/main" Requires="p14">
       <p:transition spd="slow" p14:dur="2000"/>
     </mc:Choice>
     <mc:Fallback>
@@ -22019,7 +21968,7 @@
     </p:spTree>
     <p:extLst>
       <p:ext uri="{BB962C8B-B14F-4D97-AF65-F5344CB8AC3E}">
-        <p14:creationId xmlns:p14="http://schemas.microsoft.com/office/powerpoint/2010/main" xmlns="" val="1317972916"/>
+        <p14:creationId xmlns="" xmlns:p14="http://schemas.microsoft.com/office/powerpoint/2010/main" val="1317972916"/>
       </p:ext>
     </p:extLst>
   </p:cSld>
@@ -22027,7 +21976,7 @@
     <a:masterClrMapping/>
   </p:clrMapOvr>
   <mc:AlternateContent xmlns:mc="http://schemas.openxmlformats.org/markup-compatibility/2006">
-    <mc:Choice xmlns:p14="http://schemas.microsoft.com/office/powerpoint/2010/main" xmlns="" Requires="p14">
+    <mc:Choice xmlns="" xmlns:p14="http://schemas.microsoft.com/office/powerpoint/2010/main" Requires="p14">
       <p:transition spd="slow" p14:dur="2000"/>
     </mc:Choice>
     <mc:Fallback>
@@ -22197,7 +22146,7 @@
     </p:spTree>
     <p:extLst>
       <p:ext uri="{BB962C8B-B14F-4D97-AF65-F5344CB8AC3E}">
-        <p14:creationId xmlns:p14="http://schemas.microsoft.com/office/powerpoint/2010/main" xmlns="" val="1092219178"/>
+        <p14:creationId xmlns="" xmlns:p14="http://schemas.microsoft.com/office/powerpoint/2010/main" val="1092219178"/>
       </p:ext>
     </p:extLst>
   </p:cSld>
@@ -22276,7 +22225,7 @@
     </p:spTree>
     <p:extLst>
       <p:ext uri="{BB962C8B-B14F-4D97-AF65-F5344CB8AC3E}">
-        <p14:creationId xmlns:p14="http://schemas.microsoft.com/office/powerpoint/2010/main" xmlns="" val="1313777838"/>
+        <p14:creationId xmlns="" xmlns:p14="http://schemas.microsoft.com/office/powerpoint/2010/main" val="1313777838"/>
       </p:ext>
     </p:extLst>
   </p:cSld>
@@ -22383,7 +22332,7 @@
     </p:spTree>
     <p:extLst>
       <p:ext uri="{BB962C8B-B14F-4D97-AF65-F5344CB8AC3E}">
-        <p14:creationId xmlns:p14="http://schemas.microsoft.com/office/powerpoint/2010/main" xmlns="" val="3097674251"/>
+        <p14:creationId xmlns="" xmlns:p14="http://schemas.microsoft.com/office/powerpoint/2010/main" val="3097674251"/>
       </p:ext>
     </p:extLst>
   </p:cSld>
@@ -22539,7 +22488,7 @@
     </p:spTree>
     <p:extLst>
       <p:ext uri="{BB962C8B-B14F-4D97-AF65-F5344CB8AC3E}">
-        <p14:creationId xmlns:p14="http://schemas.microsoft.com/office/powerpoint/2010/main" xmlns="" val="2849682368"/>
+        <p14:creationId xmlns="" xmlns:p14="http://schemas.microsoft.com/office/powerpoint/2010/main" val="2849682368"/>
       </p:ext>
     </p:extLst>
   </p:cSld>
@@ -23527,7 +23476,7 @@
     </p:spTree>
     <p:extLst>
       <p:ext uri="{BB962C8B-B14F-4D97-AF65-F5344CB8AC3E}">
-        <p14:creationId xmlns:p14="http://schemas.microsoft.com/office/powerpoint/2010/main" xmlns="" val="3111131151"/>
+        <p14:creationId xmlns="" xmlns:p14="http://schemas.microsoft.com/office/powerpoint/2010/main" val="3111131151"/>
       </p:ext>
     </p:extLst>
   </p:cSld>
@@ -24776,7 +24725,7 @@
     </p:spTree>
     <p:extLst>
       <p:ext uri="{BB962C8B-B14F-4D97-AF65-F5344CB8AC3E}">
-        <p14:creationId xmlns:p14="http://schemas.microsoft.com/office/powerpoint/2010/main" xmlns="" val="4252814889"/>
+        <p14:creationId xmlns="" xmlns:p14="http://schemas.microsoft.com/office/powerpoint/2010/main" val="4252814889"/>
       </p:ext>
     </p:extLst>
   </p:cSld>
@@ -24938,7 +24887,7 @@
     </p:spTree>
     <p:extLst>
       <p:ext uri="{BB962C8B-B14F-4D97-AF65-F5344CB8AC3E}">
-        <p14:creationId xmlns:p14="http://schemas.microsoft.com/office/powerpoint/2010/main" xmlns="" val="1175923561"/>
+        <p14:creationId xmlns="" xmlns:p14="http://schemas.microsoft.com/office/powerpoint/2010/main" val="1175923561"/>
       </p:ext>
     </p:extLst>
   </p:cSld>
@@ -25092,7 +25041,7 @@
     </p:spTree>
     <p:extLst>
       <p:ext uri="{BB962C8B-B14F-4D97-AF65-F5344CB8AC3E}">
-        <p14:creationId xmlns:p14="http://schemas.microsoft.com/office/powerpoint/2010/main" xmlns="" val="1315467346"/>
+        <p14:creationId xmlns="" xmlns:p14="http://schemas.microsoft.com/office/powerpoint/2010/main" val="1315467346"/>
       </p:ext>
     </p:extLst>
   </p:cSld>
@@ -25171,7 +25120,7 @@
     </p:spTree>
     <p:extLst>
       <p:ext uri="{BB962C8B-B14F-4D97-AF65-F5344CB8AC3E}">
-        <p14:creationId xmlns:p14="http://schemas.microsoft.com/office/powerpoint/2010/main" xmlns="" val="984054703"/>
+        <p14:creationId xmlns="" xmlns:p14="http://schemas.microsoft.com/office/powerpoint/2010/main" val="984054703"/>
       </p:ext>
     </p:extLst>
   </p:cSld>
@@ -25276,7 +25225,52 @@
             </a:r>
             <a:r>
               <a:rPr lang="en-US" dirty="0" smtClean="0"/>
-              <a:t>SSE Client</a:t>
+              <a:t>SSE </a:t>
+            </a:r>
+            <a:r>
+              <a:rPr lang="en-US" dirty="0" smtClean="0"/>
+              <a:t>Client</a:t>
+            </a:r>
+          </a:p>
+          <a:p>
+            <a:r>
+              <a:rPr lang="de-DE" dirty="0" smtClean="0"/>
+              <a:t>JavaFX </a:t>
+            </a:r>
+            <a:r>
+              <a:rPr lang="en-US" dirty="0" smtClean="0"/>
+              <a:t>Drawing Board client</a:t>
+            </a:r>
+            <a:r>
+              <a:rPr lang="en-US" dirty="0" smtClean="0"/>
+              <a:t>:</a:t>
+            </a:r>
+          </a:p>
+          <a:p>
+            <a:pPr lvl="1"/>
+            <a:r>
+              <a:rPr lang="en-US" dirty="0" smtClean="0"/>
+              <a:t>Exercise </a:t>
+            </a:r>
+            <a:r>
+              <a:rPr lang="en-US" dirty="0" smtClean="0"/>
+              <a:t>5: </a:t>
+            </a:r>
+            <a:r>
+              <a:rPr lang="en-US" dirty="0" smtClean="0"/>
+              <a:t>Implementing a </a:t>
+            </a:r>
+            <a:r>
+              <a:rPr lang="en-US" dirty="0" smtClean="0"/>
+              <a:t>hybrid </a:t>
+            </a:r>
+            <a:r>
+              <a:rPr lang="en-US" dirty="0" err="1" smtClean="0"/>
+              <a:t>JavaFX</a:t>
+            </a:r>
+            <a:r>
+              <a:rPr lang="en-US" dirty="0" smtClean="0"/>
+              <a:t> Drawing Board Client</a:t>
             </a:r>
             <a:endParaRPr lang="en-US" dirty="0"/>
           </a:p>
@@ -25288,7 +25282,7 @@
     </p:spTree>
     <p:extLst>
       <p:ext uri="{BB962C8B-B14F-4D97-AF65-F5344CB8AC3E}">
-        <p14:creationId xmlns:p14="http://schemas.microsoft.com/office/powerpoint/2010/main" xmlns="" val="1409049274"/>
+        <p14:creationId xmlns="" xmlns:p14="http://schemas.microsoft.com/office/powerpoint/2010/main" val="1409049274"/>
       </p:ext>
     </p:extLst>
   </p:cSld>
@@ -25400,7 +25394,7 @@
               </a:ln>
               <a:extLst>
                 <a:ext uri="{909E8E84-426E-40dd-AFC4-6F175D3DCCD1}">
-                  <a14:hiddenFill xmlns:a14="http://schemas.microsoft.com/office/drawing/2010/main" xmlns="">
+                  <a14:hiddenFill xmlns="" xmlns:a14="http://schemas.microsoft.com/office/drawing/2010/main">
                     <a:noFill/>
                   </a14:hiddenFill>
                 </a:ext>
@@ -25470,7 +25464,7 @@
               </a:ln>
               <a:extLst>
                 <a:ext uri="{909E8E84-426E-40dd-AFC4-6F175D3DCCD1}">
-                  <a14:hiddenFill xmlns:a14="http://schemas.microsoft.com/office/drawing/2010/main" xmlns="">
+                  <a14:hiddenFill xmlns="" xmlns:a14="http://schemas.microsoft.com/office/drawing/2010/main">
                     <a:noFill/>
                   </a14:hiddenFill>
                 </a:ext>
@@ -25540,7 +25534,7 @@
               </a:ln>
               <a:extLst>
                 <a:ext uri="{909E8E84-426E-40dd-AFC4-6F175D3DCCD1}">
-                  <a14:hiddenFill xmlns:a14="http://schemas.microsoft.com/office/drawing/2010/main" xmlns="">
+                  <a14:hiddenFill xmlns="" xmlns:a14="http://schemas.microsoft.com/office/drawing/2010/main">
                     <a:noFill/>
                   </a14:hiddenFill>
                 </a:ext>
@@ -25867,14 +25861,14 @@
               </a:ln>
               <a:extLst>
                 <a:ext uri="{909E8E84-426E-40dd-AFC4-6F175D3DCCD1}">
-                  <a14:hiddenFill xmlns:a14="http://schemas.microsoft.com/office/drawing/2010/main" xmlns="">
+                  <a14:hiddenFill xmlns="" xmlns:a14="http://schemas.microsoft.com/office/drawing/2010/main">
                     <a:solidFill>
                       <a:srgbClr val="FFFFFF"/>
                     </a:solidFill>
                   </a14:hiddenFill>
                 </a:ext>
                 <a:ext uri="{91240B29-F687-4f45-9708-019B960494DF}">
-                  <a14:hiddenLine xmlns:a14="http://schemas.microsoft.com/office/drawing/2010/main" xmlns="" w="9525">
+                  <a14:hiddenLine xmlns="" xmlns:a14="http://schemas.microsoft.com/office/drawing/2010/main" w="9525">
                     <a:solidFill>
                       <a:srgbClr val="000000"/>
                     </a:solidFill>
@@ -25962,14 +25956,14 @@
               </a:ln>
               <a:extLst>
                 <a:ext uri="{909E8E84-426E-40dd-AFC4-6F175D3DCCD1}">
-                  <a14:hiddenFill xmlns:a14="http://schemas.microsoft.com/office/drawing/2010/main" xmlns="">
+                  <a14:hiddenFill xmlns="" xmlns:a14="http://schemas.microsoft.com/office/drawing/2010/main">
                     <a:solidFill>
                       <a:srgbClr val="FFFFFF"/>
                     </a:solidFill>
                   </a14:hiddenFill>
                 </a:ext>
                 <a:ext uri="{91240B29-F687-4f45-9708-019B960494DF}">
-                  <a14:hiddenLine xmlns:a14="http://schemas.microsoft.com/office/drawing/2010/main" xmlns="" w="9525">
+                  <a14:hiddenLine xmlns="" xmlns:a14="http://schemas.microsoft.com/office/drawing/2010/main" w="9525">
                     <a:solidFill>
                       <a:srgbClr val="000000"/>
                     </a:solidFill>
@@ -26057,14 +26051,14 @@
               </a:ln>
               <a:extLst>
                 <a:ext uri="{909E8E84-426E-40dd-AFC4-6F175D3DCCD1}">
-                  <a14:hiddenFill xmlns:a14="http://schemas.microsoft.com/office/drawing/2010/main" xmlns="">
+                  <a14:hiddenFill xmlns="" xmlns:a14="http://schemas.microsoft.com/office/drawing/2010/main">
                     <a:solidFill>
                       <a:srgbClr val="FFFFFF"/>
                     </a:solidFill>
                   </a14:hiddenFill>
                 </a:ext>
                 <a:ext uri="{91240B29-F687-4f45-9708-019B960494DF}">
-                  <a14:hiddenLine xmlns:a14="http://schemas.microsoft.com/office/drawing/2010/main" xmlns="" w="9525">
+                  <a14:hiddenLine xmlns="" xmlns:a14="http://schemas.microsoft.com/office/drawing/2010/main" w="9525">
                     <a:solidFill>
                       <a:srgbClr val="000000"/>
                     </a:solidFill>
@@ -26168,14 +26162,14 @@
               </a:ln>
               <a:extLst>
                 <a:ext uri="{909E8E84-426E-40dd-AFC4-6F175D3DCCD1}">
-                  <a14:hiddenFill xmlns:a14="http://schemas.microsoft.com/office/drawing/2010/main" xmlns="">
+                  <a14:hiddenFill xmlns="" xmlns:a14="http://schemas.microsoft.com/office/drawing/2010/main">
                     <a:solidFill>
                       <a:srgbClr val="FFFFFF"/>
                     </a:solidFill>
                   </a14:hiddenFill>
                 </a:ext>
                 <a:ext uri="{91240B29-F687-4f45-9708-019B960494DF}">
-                  <a14:hiddenLine xmlns:a14="http://schemas.microsoft.com/office/drawing/2010/main" xmlns="" w="9525">
+                  <a14:hiddenLine xmlns="" xmlns:a14="http://schemas.microsoft.com/office/drawing/2010/main" w="9525">
                     <a:solidFill>
                       <a:srgbClr val="000000"/>
                     </a:solidFill>
@@ -26269,7 +26263,7 @@
             </a:ln>
             <a:extLst>
               <a:ext uri="{909E8E84-426E-40dd-AFC4-6F175D3DCCD1}">
-                <a14:hiddenFill xmlns:a14="http://schemas.microsoft.com/office/drawing/2010/main" xmlns="">
+                <a14:hiddenFill xmlns="" xmlns:a14="http://schemas.microsoft.com/office/drawing/2010/main">
                   <a:noFill/>
                 </a14:hiddenFill>
               </a:ext>
@@ -26339,7 +26333,7 @@
             </a:ln>
             <a:extLst>
               <a:ext uri="{909E8E84-426E-40dd-AFC4-6F175D3DCCD1}">
-                <a14:hiddenFill xmlns:a14="http://schemas.microsoft.com/office/drawing/2010/main" xmlns="">
+                <a14:hiddenFill xmlns="" xmlns:a14="http://schemas.microsoft.com/office/drawing/2010/main">
                   <a:noFill/>
                 </a14:hiddenFill>
               </a:ext>
@@ -26830,7 +26824,7 @@
     </p:spTree>
     <p:extLst>
       <p:ext uri="{BB962C8B-B14F-4D97-AF65-F5344CB8AC3E}">
-        <p14:creationId xmlns:p14="http://schemas.microsoft.com/office/powerpoint/2010/main" xmlns="" val="279231731"/>
+        <p14:creationId xmlns="" xmlns:p14="http://schemas.microsoft.com/office/powerpoint/2010/main" val="279231731"/>
       </p:ext>
     </p:extLst>
   </p:cSld>
@@ -26952,31 +26946,11 @@
           <a:p>
             <a:r>
               <a:rPr lang="en-US" dirty="0" smtClean="0"/>
-              <a:t>Open lab-</a:t>
-            </a:r>
-            <a:r>
-              <a:rPr lang="en-US" dirty="0" err="1" smtClean="0"/>
-              <a:t>guide.pdf</a:t>
-            </a:r>
-            <a:endParaRPr lang="en-US" dirty="0" smtClean="0"/>
-          </a:p>
-          <a:p>
-            <a:pPr lvl="1"/>
+              <a:t>Open </a:t>
+            </a:r>
             <a:r>
               <a:rPr lang="en-US" dirty="0" smtClean="0"/>
-              <a:t>Look at Appendix to configure </a:t>
-            </a:r>
-            <a:r>
-              <a:rPr lang="en-US" dirty="0" err="1" smtClean="0"/>
-              <a:t>GlassFish</a:t>
-            </a:r>
-            <a:r>
-              <a:rPr lang="en-US" dirty="0" smtClean="0"/>
-              <a:t> in </a:t>
-            </a:r>
-            <a:r>
-              <a:rPr lang="en-US" dirty="0" err="1" smtClean="0"/>
-              <a:t>NetBeans</a:t>
+              <a:t>lab-guide.pdf</a:t>
             </a:r>
             <a:endParaRPr lang="en-US" dirty="0" smtClean="0"/>
           </a:p>
@@ -27007,7 +26981,7 @@
     </p:spTree>
     <p:extLst>
       <p:ext uri="{BB962C8B-B14F-4D97-AF65-F5344CB8AC3E}">
-        <p14:creationId xmlns:p14="http://schemas.microsoft.com/office/powerpoint/2010/main" xmlns="" val="3889292888"/>
+        <p14:creationId xmlns="" xmlns:p14="http://schemas.microsoft.com/office/powerpoint/2010/main" val="3889292888"/>
       </p:ext>
     </p:extLst>
   </p:cSld>
@@ -27210,7 +27184,7 @@
     </p:spTree>
     <p:extLst>
       <p:ext uri="{BB962C8B-B14F-4D97-AF65-F5344CB8AC3E}">
-        <p14:creationId xmlns:p14="http://schemas.microsoft.com/office/powerpoint/2010/main" xmlns="" val="3460529618"/>
+        <p14:creationId xmlns="" xmlns:p14="http://schemas.microsoft.com/office/powerpoint/2010/main" val="3460529618"/>
       </p:ext>
     </p:extLst>
   </p:cSld>
@@ -27324,7 +27298,7 @@
     </p:spTree>
     <p:extLst>
       <p:ext uri="{BB962C8B-B14F-4D97-AF65-F5344CB8AC3E}">
-        <p14:creationId xmlns:p14="http://schemas.microsoft.com/office/powerpoint/2010/main" xmlns="" val="3189849596"/>
+        <p14:creationId xmlns="" xmlns:p14="http://schemas.microsoft.com/office/powerpoint/2010/main" val="3189849596"/>
       </p:ext>
     </p:extLst>
   </p:cSld>
@@ -27403,7 +27377,7 @@
     </p:spTree>
     <p:extLst>
       <p:ext uri="{BB962C8B-B14F-4D97-AF65-F5344CB8AC3E}">
-        <p14:creationId xmlns:p14="http://schemas.microsoft.com/office/powerpoint/2010/main" xmlns="" val="1313777838"/>
+        <p14:creationId xmlns="" xmlns:p14="http://schemas.microsoft.com/office/powerpoint/2010/main" val="1313777838"/>
       </p:ext>
     </p:extLst>
   </p:cSld>
@@ -27560,7 +27534,7 @@
     </p:spTree>
     <p:extLst>
       <p:ext uri="{BB962C8B-B14F-4D97-AF65-F5344CB8AC3E}">
-        <p14:creationId xmlns:p14="http://schemas.microsoft.com/office/powerpoint/2010/main" xmlns="" val="3412960900"/>
+        <p14:creationId xmlns="" xmlns:p14="http://schemas.microsoft.com/office/powerpoint/2010/main" val="3412960900"/>
       </p:ext>
     </p:extLst>
   </p:cSld>
@@ -27977,7 +27951,7 @@
     </p:spTree>
     <p:extLst>
       <p:ext uri="{BB962C8B-B14F-4D97-AF65-F5344CB8AC3E}">
-        <p14:creationId xmlns:p14="http://schemas.microsoft.com/office/powerpoint/2010/main" xmlns="" val="786050361"/>
+        <p14:creationId xmlns="" xmlns:p14="http://schemas.microsoft.com/office/powerpoint/2010/main" val="786050361"/>
       </p:ext>
     </p:extLst>
   </p:cSld>

</xml_diff>